<commit_message>
Updated Dataset to 2018
</commit_message>
<xml_diff>
--- a/personEP.pptx
+++ b/personEP.pptx
@@ -4,12 +4,14 @@
   <p:sldMasterIdLst>
     <p:sldMasterId id="2147483648" r:id="rId1"/>
   </p:sldMasterIdLst>
+  <p:notesMasterIdLst>
+    <p:notesMasterId r:id="rId6"/>
+  </p:notesMasterIdLst>
   <p:sldIdLst>
     <p:sldId id="256" r:id="rId2"/>
     <p:sldId id="259" r:id="rId3"/>
     <p:sldId id="260" r:id="rId4"/>
-    <p:sldId id="258" r:id="rId5"/>
-    <p:sldId id="257" r:id="rId6"/>
+    <p:sldId id="257" r:id="rId5"/>
   </p:sldIdLst>
   <p:sldSz cx="12192000" cy="6858000"/>
   <p:notesSz cx="6858000" cy="9144000"/>
@@ -108,6 +110,11 @@
       </a:defRPr>
     </a:lvl9pPr>
   </p:defaultTextStyle>
+  <p:extLst>
+    <p:ext uri="{EFAFB233-063F-42B5-8137-9DF3F51BA10A}">
+      <p15:sldGuideLst xmlns:p15="http://schemas.microsoft.com/office/powerpoint/2012/main"/>
+    </p:ext>
+  </p:extLst>
 </p:presentation>
 </file>
 
@@ -1133,7 +1140,15 @@
         <a:p>
           <a:r>
             <a:rPr lang="en-US" dirty="0"/>
-            <a:t>Created age groups using .loc function and count records by groups</a:t>
+            <a:t>Created and counted age groups using .loc and </a:t>
+          </a:r>
+          <a:r>
+            <a:rPr lang="en-US" dirty="0" err="1"/>
+            <a:t>len</a:t>
+          </a:r>
+          <a:r>
+            <a:rPr lang="en-US" dirty="0"/>
+            <a:t>() functions</a:t>
           </a:r>
         </a:p>
       </dgm:t>
@@ -1335,12 +1350,12 @@
         </a:fontRef>
       </dsp:style>
       <dsp:txBody>
-        <a:bodyPr spcFirstLastPara="0" vert="horz" wrap="square" lIns="91440" tIns="91440" rIns="91440" bIns="91440" numCol="1" spcCol="1270" anchor="ctr" anchorCtr="0">
+        <a:bodyPr spcFirstLastPara="0" vert="horz" wrap="square" lIns="95250" tIns="95250" rIns="95250" bIns="95250" numCol="1" spcCol="1270" anchor="ctr" anchorCtr="0">
           <a:noAutofit/>
         </a:bodyPr>
         <a:lstStyle/>
         <a:p>
-          <a:pPr marL="0" lvl="0" indent="0" algn="ctr" defTabSz="1066800">
+          <a:pPr marL="0" lvl="0" indent="0" algn="ctr" defTabSz="1111250">
             <a:lnSpc>
               <a:spcPct val="90000"/>
             </a:lnSpc>
@@ -1353,15 +1368,15 @@
             <a:buNone/>
           </a:pPr>
           <a:r>
-            <a:rPr lang="en-US" sz="2400" kern="1200" dirty="0"/>
+            <a:rPr lang="en-US" sz="2500" kern="1200" dirty="0"/>
             <a:t>Data Analysis with Python and pandas using </a:t>
           </a:r>
           <a:r>
-            <a:rPr lang="en-US" sz="2400" kern="1200" dirty="0" err="1"/>
+            <a:rPr lang="en-US" sz="2500" kern="1200" dirty="0" err="1"/>
             <a:t>Jupyter</a:t>
           </a:r>
           <a:r>
-            <a:rPr lang="en-US" sz="2400" kern="1200" dirty="0"/>
+            <a:rPr lang="en-US" sz="2500" kern="1200" dirty="0"/>
             <a:t> Notebook </a:t>
           </a:r>
         </a:p>
@@ -1420,12 +1435,12 @@
         </a:fontRef>
       </dsp:style>
       <dsp:txBody>
-        <a:bodyPr spcFirstLastPara="0" vert="horz" wrap="square" lIns="91440" tIns="91440" rIns="91440" bIns="91440" numCol="1" spcCol="1270" anchor="ctr" anchorCtr="0">
+        <a:bodyPr spcFirstLastPara="0" vert="horz" wrap="square" lIns="95250" tIns="95250" rIns="95250" bIns="95250" numCol="1" spcCol="1270" anchor="ctr" anchorCtr="0">
           <a:noAutofit/>
         </a:bodyPr>
         <a:lstStyle/>
         <a:p>
-          <a:pPr marL="0" lvl="0" indent="0" algn="ctr" defTabSz="1066800">
+          <a:pPr marL="0" lvl="0" indent="0" algn="ctr" defTabSz="1111250">
             <a:lnSpc>
               <a:spcPct val="90000"/>
             </a:lnSpc>
@@ -1438,7 +1453,7 @@
             <a:buNone/>
           </a:pPr>
           <a:r>
-            <a:rPr lang="en-US" sz="2400" kern="1200" dirty="0"/>
+            <a:rPr lang="en-US" sz="2500" kern="1200" dirty="0"/>
             <a:t>Filtered and cleaned the data to only use driver information</a:t>
           </a:r>
         </a:p>
@@ -1497,12 +1512,12 @@
         </a:fontRef>
       </dsp:style>
       <dsp:txBody>
-        <a:bodyPr spcFirstLastPara="0" vert="horz" wrap="square" lIns="91440" tIns="91440" rIns="91440" bIns="91440" numCol="1" spcCol="1270" anchor="ctr" anchorCtr="0">
+        <a:bodyPr spcFirstLastPara="0" vert="horz" wrap="square" lIns="95250" tIns="95250" rIns="95250" bIns="95250" numCol="1" spcCol="1270" anchor="ctr" anchorCtr="0">
           <a:noAutofit/>
         </a:bodyPr>
         <a:lstStyle/>
         <a:p>
-          <a:pPr marL="0" lvl="0" indent="0" algn="ctr" defTabSz="1066800">
+          <a:pPr marL="0" lvl="0" indent="0" algn="ctr" defTabSz="1111250">
             <a:lnSpc>
               <a:spcPct val="90000"/>
             </a:lnSpc>
@@ -1515,8 +1530,16 @@
             <a:buNone/>
           </a:pPr>
           <a:r>
-            <a:rPr lang="en-US" sz="2400" kern="1200" dirty="0"/>
-            <a:t>Created age groups using .loc function and count records by groups</a:t>
+            <a:rPr lang="en-US" sz="2500" kern="1200" dirty="0"/>
+            <a:t>Created and counted age groups using .loc and </a:t>
+          </a:r>
+          <a:r>
+            <a:rPr lang="en-US" sz="2500" kern="1200" dirty="0" err="1"/>
+            <a:t>len</a:t>
+          </a:r>
+          <a:r>
+            <a:rPr lang="en-US" sz="2500" kern="1200" dirty="0"/>
+            <a:t>() functions</a:t>
           </a:r>
         </a:p>
       </dsp:txBody>
@@ -1574,12 +1597,12 @@
         </a:fontRef>
       </dsp:style>
       <dsp:txBody>
-        <a:bodyPr spcFirstLastPara="0" vert="horz" wrap="square" lIns="91440" tIns="91440" rIns="91440" bIns="91440" numCol="1" spcCol="1270" anchor="ctr" anchorCtr="0">
+        <a:bodyPr spcFirstLastPara="0" vert="horz" wrap="square" lIns="95250" tIns="95250" rIns="95250" bIns="95250" numCol="1" spcCol="1270" anchor="ctr" anchorCtr="0">
           <a:noAutofit/>
         </a:bodyPr>
         <a:lstStyle/>
         <a:p>
-          <a:pPr marL="0" lvl="0" indent="0" algn="ctr" defTabSz="1066800">
+          <a:pPr marL="0" lvl="0" indent="0" algn="ctr" defTabSz="1111250">
             <a:lnSpc>
               <a:spcPct val="90000"/>
             </a:lnSpc>
@@ -1592,7 +1615,7 @@
             <a:buNone/>
           </a:pPr>
           <a:r>
-            <a:rPr lang="en-US" sz="2400" kern="1200" dirty="0"/>
+            <a:rPr lang="en-US" sz="2500" kern="1200" dirty="0"/>
             <a:t>Stacked horizontal bar plots using matplotlib library</a:t>
           </a:r>
         </a:p>
@@ -2785,6 +2808,674 @@
     </dgm:style>
   </dgm:styleLbl>
 </dgm:styleDef>
+</file>
+
+<file path=ppt/notesMasters/notesMaster1.xml><?xml version="1.0" encoding="utf-8"?>
+<p:notesMaster xmlns:a="http://schemas.openxmlformats.org/drawingml/2006/main" xmlns:r="http://schemas.openxmlformats.org/officeDocument/2006/relationships" xmlns:p="http://schemas.openxmlformats.org/presentationml/2006/main">
+  <p:cSld>
+    <p:bg>
+      <p:bgRef idx="1001">
+        <a:schemeClr val="bg1"/>
+      </p:bgRef>
+    </p:bg>
+    <p:spTree>
+      <p:nvGrpSpPr>
+        <p:cNvPr id="1" name=""/>
+        <p:cNvGrpSpPr/>
+        <p:nvPr/>
+      </p:nvGrpSpPr>
+      <p:grpSpPr>
+        <a:xfrm>
+          <a:off x="0" y="0"/>
+          <a:ext cx="0" cy="0"/>
+          <a:chOff x="0" y="0"/>
+          <a:chExt cx="0" cy="0"/>
+        </a:xfrm>
+      </p:grpSpPr>
+      <p:sp>
+        <p:nvSpPr>
+          <p:cNvPr id="2" name="Header Placeholder 1"/>
+          <p:cNvSpPr>
+            <a:spLocks noGrp="1"/>
+          </p:cNvSpPr>
+          <p:nvPr>
+            <p:ph type="hdr" sz="quarter"/>
+          </p:nvPr>
+        </p:nvSpPr>
+        <p:spPr>
+          <a:xfrm>
+            <a:off x="0" y="0"/>
+            <a:ext cx="2971800" cy="458788"/>
+          </a:xfrm>
+          <a:prstGeom prst="rect">
+            <a:avLst/>
+          </a:prstGeom>
+        </p:spPr>
+        <p:txBody>
+          <a:bodyPr vert="horz" lIns="91440" tIns="45720" rIns="91440" bIns="45720" rtlCol="0"/>
+          <a:lstStyle>
+            <a:lvl1pPr algn="l">
+              <a:defRPr sz="1200"/>
+            </a:lvl1pPr>
+          </a:lstStyle>
+          <a:p>
+            <a:endParaRPr lang="en-US"/>
+          </a:p>
+        </p:txBody>
+      </p:sp>
+      <p:sp>
+        <p:nvSpPr>
+          <p:cNvPr id="3" name="Date Placeholder 2"/>
+          <p:cNvSpPr>
+            <a:spLocks noGrp="1"/>
+          </p:cNvSpPr>
+          <p:nvPr>
+            <p:ph type="dt" idx="1"/>
+          </p:nvPr>
+        </p:nvSpPr>
+        <p:spPr>
+          <a:xfrm>
+            <a:off x="3884613" y="0"/>
+            <a:ext cx="2971800" cy="458788"/>
+          </a:xfrm>
+          <a:prstGeom prst="rect">
+            <a:avLst/>
+          </a:prstGeom>
+        </p:spPr>
+        <p:txBody>
+          <a:bodyPr vert="horz" lIns="91440" tIns="45720" rIns="91440" bIns="45720" rtlCol="0"/>
+          <a:lstStyle>
+            <a:lvl1pPr algn="r">
+              <a:defRPr sz="1200"/>
+            </a:lvl1pPr>
+          </a:lstStyle>
+          <a:p>
+            <a:fld id="{2079571A-95CF-2149-95D2-6627C6FF122C}" type="datetimeFigureOut">
+              <a:rPr lang="en-US" smtClean="0"/>
+              <a:t>10/29/21</a:t>
+            </a:fld>
+            <a:endParaRPr lang="en-US"/>
+          </a:p>
+        </p:txBody>
+      </p:sp>
+      <p:sp>
+        <p:nvSpPr>
+          <p:cNvPr id="4" name="Slide Image Placeholder 3"/>
+          <p:cNvSpPr>
+            <a:spLocks noGrp="1" noRot="1" noChangeAspect="1"/>
+          </p:cNvSpPr>
+          <p:nvPr>
+            <p:ph type="sldImg" idx="2"/>
+          </p:nvPr>
+        </p:nvSpPr>
+        <p:spPr>
+          <a:xfrm>
+            <a:off x="685800" y="1143000"/>
+            <a:ext cx="5486400" cy="3086100"/>
+          </a:xfrm>
+          <a:prstGeom prst="rect">
+            <a:avLst/>
+          </a:prstGeom>
+          <a:noFill/>
+          <a:ln w="12700">
+            <a:solidFill>
+              <a:prstClr val="black"/>
+            </a:solidFill>
+          </a:ln>
+        </p:spPr>
+        <p:txBody>
+          <a:bodyPr vert="horz" lIns="91440" tIns="45720" rIns="91440" bIns="45720" rtlCol="0" anchor="ctr"/>
+          <a:lstStyle/>
+          <a:p>
+            <a:endParaRPr lang="en-US"/>
+          </a:p>
+        </p:txBody>
+      </p:sp>
+      <p:sp>
+        <p:nvSpPr>
+          <p:cNvPr id="5" name="Notes Placeholder 4"/>
+          <p:cNvSpPr>
+            <a:spLocks noGrp="1"/>
+          </p:cNvSpPr>
+          <p:nvPr>
+            <p:ph type="body" sz="quarter" idx="3"/>
+          </p:nvPr>
+        </p:nvSpPr>
+        <p:spPr>
+          <a:xfrm>
+            <a:off x="685800" y="4400550"/>
+            <a:ext cx="5486400" cy="3600450"/>
+          </a:xfrm>
+          <a:prstGeom prst="rect">
+            <a:avLst/>
+          </a:prstGeom>
+        </p:spPr>
+        <p:txBody>
+          <a:bodyPr vert="horz" lIns="91440" tIns="45720" rIns="91440" bIns="45720" rtlCol="0"/>
+          <a:lstStyle/>
+          <a:p>
+            <a:pPr lvl="0"/>
+            <a:r>
+              <a:rPr lang="en-US"/>
+              <a:t>Click to edit Master text styles</a:t>
+            </a:r>
+          </a:p>
+          <a:p>
+            <a:pPr lvl="1"/>
+            <a:r>
+              <a:rPr lang="en-US"/>
+              <a:t>Second level</a:t>
+            </a:r>
+          </a:p>
+          <a:p>
+            <a:pPr lvl="2"/>
+            <a:r>
+              <a:rPr lang="en-US"/>
+              <a:t>Third level</a:t>
+            </a:r>
+          </a:p>
+          <a:p>
+            <a:pPr lvl="3"/>
+            <a:r>
+              <a:rPr lang="en-US"/>
+              <a:t>Fourth level</a:t>
+            </a:r>
+          </a:p>
+          <a:p>
+            <a:pPr lvl="4"/>
+            <a:r>
+              <a:rPr lang="en-US"/>
+              <a:t>Fifth level</a:t>
+            </a:r>
+          </a:p>
+        </p:txBody>
+      </p:sp>
+      <p:sp>
+        <p:nvSpPr>
+          <p:cNvPr id="6" name="Footer Placeholder 5"/>
+          <p:cNvSpPr>
+            <a:spLocks noGrp="1"/>
+          </p:cNvSpPr>
+          <p:nvPr>
+            <p:ph type="ftr" sz="quarter" idx="4"/>
+          </p:nvPr>
+        </p:nvSpPr>
+        <p:spPr>
+          <a:xfrm>
+            <a:off x="0" y="8685213"/>
+            <a:ext cx="2971800" cy="458787"/>
+          </a:xfrm>
+          <a:prstGeom prst="rect">
+            <a:avLst/>
+          </a:prstGeom>
+        </p:spPr>
+        <p:txBody>
+          <a:bodyPr vert="horz" lIns="91440" tIns="45720" rIns="91440" bIns="45720" rtlCol="0" anchor="b"/>
+          <a:lstStyle>
+            <a:lvl1pPr algn="l">
+              <a:defRPr sz="1200"/>
+            </a:lvl1pPr>
+          </a:lstStyle>
+          <a:p>
+            <a:endParaRPr lang="en-US"/>
+          </a:p>
+        </p:txBody>
+      </p:sp>
+      <p:sp>
+        <p:nvSpPr>
+          <p:cNvPr id="7" name="Slide Number Placeholder 6"/>
+          <p:cNvSpPr>
+            <a:spLocks noGrp="1"/>
+          </p:cNvSpPr>
+          <p:nvPr>
+            <p:ph type="sldNum" sz="quarter" idx="5"/>
+          </p:nvPr>
+        </p:nvSpPr>
+        <p:spPr>
+          <a:xfrm>
+            <a:off x="3884613" y="8685213"/>
+            <a:ext cx="2971800" cy="458787"/>
+          </a:xfrm>
+          <a:prstGeom prst="rect">
+            <a:avLst/>
+          </a:prstGeom>
+        </p:spPr>
+        <p:txBody>
+          <a:bodyPr vert="horz" lIns="91440" tIns="45720" rIns="91440" bIns="45720" rtlCol="0" anchor="b"/>
+          <a:lstStyle>
+            <a:lvl1pPr algn="r">
+              <a:defRPr sz="1200"/>
+            </a:lvl1pPr>
+          </a:lstStyle>
+          <a:p>
+            <a:fld id="{4D94949D-2744-2049-A342-6D0F93C09BCD}" type="slidenum">
+              <a:rPr lang="en-US" smtClean="0"/>
+              <a:t>‹#›</a:t>
+            </a:fld>
+            <a:endParaRPr lang="en-US"/>
+          </a:p>
+        </p:txBody>
+      </p:sp>
+    </p:spTree>
+    <p:extLst>
+      <p:ext uri="{BB962C8B-B14F-4D97-AF65-F5344CB8AC3E}">
+        <p14:creationId xmlns:p14="http://schemas.microsoft.com/office/powerpoint/2010/main" val="2249234578"/>
+      </p:ext>
+    </p:extLst>
+  </p:cSld>
+  <p:clrMap bg1="lt1" tx1="dk1" bg2="lt2" tx2="dk2" accent1="accent1" accent2="accent2" accent3="accent3" accent4="accent4" accent5="accent5" accent6="accent6" hlink="hlink" folHlink="folHlink"/>
+  <p:notesStyle>
+    <a:lvl1pPr marL="0" algn="l" defTabSz="914400" rtl="0" eaLnBrk="1" latinLnBrk="0" hangingPunct="1">
+      <a:defRPr sz="1200" kern="1200">
+        <a:solidFill>
+          <a:schemeClr val="tx1"/>
+        </a:solidFill>
+        <a:latin typeface="+mn-lt"/>
+        <a:ea typeface="+mn-ea"/>
+        <a:cs typeface="+mn-cs"/>
+      </a:defRPr>
+    </a:lvl1pPr>
+    <a:lvl2pPr marL="457200" algn="l" defTabSz="914400" rtl="0" eaLnBrk="1" latinLnBrk="0" hangingPunct="1">
+      <a:defRPr sz="1200" kern="1200">
+        <a:solidFill>
+          <a:schemeClr val="tx1"/>
+        </a:solidFill>
+        <a:latin typeface="+mn-lt"/>
+        <a:ea typeface="+mn-ea"/>
+        <a:cs typeface="+mn-cs"/>
+      </a:defRPr>
+    </a:lvl2pPr>
+    <a:lvl3pPr marL="914400" algn="l" defTabSz="914400" rtl="0" eaLnBrk="1" latinLnBrk="0" hangingPunct="1">
+      <a:defRPr sz="1200" kern="1200">
+        <a:solidFill>
+          <a:schemeClr val="tx1"/>
+        </a:solidFill>
+        <a:latin typeface="+mn-lt"/>
+        <a:ea typeface="+mn-ea"/>
+        <a:cs typeface="+mn-cs"/>
+      </a:defRPr>
+    </a:lvl3pPr>
+    <a:lvl4pPr marL="1371600" algn="l" defTabSz="914400" rtl="0" eaLnBrk="1" latinLnBrk="0" hangingPunct="1">
+      <a:defRPr sz="1200" kern="1200">
+        <a:solidFill>
+          <a:schemeClr val="tx1"/>
+        </a:solidFill>
+        <a:latin typeface="+mn-lt"/>
+        <a:ea typeface="+mn-ea"/>
+        <a:cs typeface="+mn-cs"/>
+      </a:defRPr>
+    </a:lvl4pPr>
+    <a:lvl5pPr marL="1828800" algn="l" defTabSz="914400" rtl="0" eaLnBrk="1" latinLnBrk="0" hangingPunct="1">
+      <a:defRPr sz="1200" kern="1200">
+        <a:solidFill>
+          <a:schemeClr val="tx1"/>
+        </a:solidFill>
+        <a:latin typeface="+mn-lt"/>
+        <a:ea typeface="+mn-ea"/>
+        <a:cs typeface="+mn-cs"/>
+      </a:defRPr>
+    </a:lvl5pPr>
+    <a:lvl6pPr marL="2286000" algn="l" defTabSz="914400" rtl="0" eaLnBrk="1" latinLnBrk="0" hangingPunct="1">
+      <a:defRPr sz="1200" kern="1200">
+        <a:solidFill>
+          <a:schemeClr val="tx1"/>
+        </a:solidFill>
+        <a:latin typeface="+mn-lt"/>
+        <a:ea typeface="+mn-ea"/>
+        <a:cs typeface="+mn-cs"/>
+      </a:defRPr>
+    </a:lvl6pPr>
+    <a:lvl7pPr marL="2743200" algn="l" defTabSz="914400" rtl="0" eaLnBrk="1" latinLnBrk="0" hangingPunct="1">
+      <a:defRPr sz="1200" kern="1200">
+        <a:solidFill>
+          <a:schemeClr val="tx1"/>
+        </a:solidFill>
+        <a:latin typeface="+mn-lt"/>
+        <a:ea typeface="+mn-ea"/>
+        <a:cs typeface="+mn-cs"/>
+      </a:defRPr>
+    </a:lvl7pPr>
+    <a:lvl8pPr marL="3200400" algn="l" defTabSz="914400" rtl="0" eaLnBrk="1" latinLnBrk="0" hangingPunct="1">
+      <a:defRPr sz="1200" kern="1200">
+        <a:solidFill>
+          <a:schemeClr val="tx1"/>
+        </a:solidFill>
+        <a:latin typeface="+mn-lt"/>
+        <a:ea typeface="+mn-ea"/>
+        <a:cs typeface="+mn-cs"/>
+      </a:defRPr>
+    </a:lvl8pPr>
+    <a:lvl9pPr marL="3657600" algn="l" defTabSz="914400" rtl="0" eaLnBrk="1" latinLnBrk="0" hangingPunct="1">
+      <a:defRPr sz="1200" kern="1200">
+        <a:solidFill>
+          <a:schemeClr val="tx1"/>
+        </a:solidFill>
+        <a:latin typeface="+mn-lt"/>
+        <a:ea typeface="+mn-ea"/>
+        <a:cs typeface="+mn-cs"/>
+      </a:defRPr>
+    </a:lvl9pPr>
+  </p:notesStyle>
+</p:notesMaster>
+</file>
+
+<file path=ppt/notesSlides/notesSlide1.xml><?xml version="1.0" encoding="utf-8"?>
+<p:notes xmlns:a="http://schemas.openxmlformats.org/drawingml/2006/main" xmlns:r="http://schemas.openxmlformats.org/officeDocument/2006/relationships" xmlns:p="http://schemas.openxmlformats.org/presentationml/2006/main">
+  <p:cSld>
+    <p:spTree>
+      <p:nvGrpSpPr>
+        <p:cNvPr id="1" name=""/>
+        <p:cNvGrpSpPr/>
+        <p:nvPr/>
+      </p:nvGrpSpPr>
+      <p:grpSpPr>
+        <a:xfrm>
+          <a:off x="0" y="0"/>
+          <a:ext cx="0" cy="0"/>
+          <a:chOff x="0" y="0"/>
+          <a:chExt cx="0" cy="0"/>
+        </a:xfrm>
+      </p:grpSpPr>
+      <p:sp>
+        <p:nvSpPr>
+          <p:cNvPr id="2" name="Slide Image Placeholder 1"/>
+          <p:cNvSpPr>
+            <a:spLocks noGrp="1" noRot="1" noChangeAspect="1"/>
+          </p:cNvSpPr>
+          <p:nvPr>
+            <p:ph type="sldImg"/>
+          </p:nvPr>
+        </p:nvSpPr>
+        <p:spPr/>
+      </p:sp>
+      <p:sp>
+        <p:nvSpPr>
+          <p:cNvPr id="3" name="Notes Placeholder 2"/>
+          <p:cNvSpPr>
+            <a:spLocks noGrp="1"/>
+          </p:cNvSpPr>
+          <p:nvPr>
+            <p:ph type="body" idx="1"/>
+          </p:nvPr>
+        </p:nvSpPr>
+        <p:spPr/>
+        <p:txBody>
+          <a:bodyPr/>
+          <a:lstStyle/>
+          <a:p>
+            <a:endParaRPr lang="en-US" dirty="0"/>
+          </a:p>
+        </p:txBody>
+      </p:sp>
+      <p:sp>
+        <p:nvSpPr>
+          <p:cNvPr id="4" name="Slide Number Placeholder 3"/>
+          <p:cNvSpPr>
+            <a:spLocks noGrp="1"/>
+          </p:cNvSpPr>
+          <p:nvPr>
+            <p:ph type="sldNum" sz="quarter" idx="5"/>
+          </p:nvPr>
+        </p:nvSpPr>
+        <p:spPr/>
+        <p:txBody>
+          <a:bodyPr/>
+          <a:lstStyle/>
+          <a:p>
+            <a:fld id="{4D94949D-2744-2049-A342-6D0F93C09BCD}" type="slidenum">
+              <a:rPr lang="en-US" smtClean="0"/>
+              <a:t>1</a:t>
+            </a:fld>
+            <a:endParaRPr lang="en-US"/>
+          </a:p>
+        </p:txBody>
+      </p:sp>
+    </p:spTree>
+    <p:extLst>
+      <p:ext uri="{BB962C8B-B14F-4D97-AF65-F5344CB8AC3E}">
+        <p14:creationId xmlns:p14="http://schemas.microsoft.com/office/powerpoint/2010/main" val="3647981655"/>
+      </p:ext>
+    </p:extLst>
+  </p:cSld>
+  <p:clrMapOvr>
+    <a:masterClrMapping/>
+  </p:clrMapOvr>
+</p:notes>
+</file>
+
+<file path=ppt/notesSlides/notesSlide2.xml><?xml version="1.0" encoding="utf-8"?>
+<p:notes xmlns:a="http://schemas.openxmlformats.org/drawingml/2006/main" xmlns:r="http://schemas.openxmlformats.org/officeDocument/2006/relationships" xmlns:p="http://schemas.openxmlformats.org/presentationml/2006/main">
+  <p:cSld>
+    <p:spTree>
+      <p:nvGrpSpPr>
+        <p:cNvPr id="1" name=""/>
+        <p:cNvGrpSpPr/>
+        <p:nvPr/>
+      </p:nvGrpSpPr>
+      <p:grpSpPr>
+        <a:xfrm>
+          <a:off x="0" y="0"/>
+          <a:ext cx="0" cy="0"/>
+          <a:chOff x="0" y="0"/>
+          <a:chExt cx="0" cy="0"/>
+        </a:xfrm>
+      </p:grpSpPr>
+      <p:sp>
+        <p:nvSpPr>
+          <p:cNvPr id="2" name="Slide Image Placeholder 1"/>
+          <p:cNvSpPr>
+            <a:spLocks noGrp="1" noRot="1" noChangeAspect="1"/>
+          </p:cNvSpPr>
+          <p:nvPr>
+            <p:ph type="sldImg"/>
+          </p:nvPr>
+        </p:nvSpPr>
+        <p:spPr/>
+      </p:sp>
+      <p:sp>
+        <p:nvSpPr>
+          <p:cNvPr id="3" name="Notes Placeholder 2"/>
+          <p:cNvSpPr>
+            <a:spLocks noGrp="1"/>
+          </p:cNvSpPr>
+          <p:nvPr>
+            <p:ph type="body" idx="1"/>
+          </p:nvPr>
+        </p:nvSpPr>
+        <p:spPr/>
+        <p:txBody>
+          <a:bodyPr/>
+          <a:lstStyle/>
+          <a:p>
+            <a:r>
+              <a:rPr lang="en-US" dirty="0"/>
+              <a:t>We utilize the dataset that contains the crash report managed by the National Highway Traffic Safety Administration (NHTSA) of the US Department of Transportation in 2019.  This dataset includes information such as the injury severity, the age &amp; gender of persons involved, the vehicle information, and the accident time and location by US region.</a:t>
+            </a:r>
+          </a:p>
+          <a:p>
+            <a:r>
+              <a:rPr lang="en-US" dirty="0"/>
+              <a:t>We use visualization method and summary statistics to explore the data analytics.  The objective is to understand the data, discover patterns, and to establish the relationships between the data elements. </a:t>
+            </a:r>
+          </a:p>
+          <a:p>
+            <a:endParaRPr lang="en-US" dirty="0"/>
+          </a:p>
+        </p:txBody>
+      </p:sp>
+      <p:sp>
+        <p:nvSpPr>
+          <p:cNvPr id="4" name="Slide Number Placeholder 3"/>
+          <p:cNvSpPr>
+            <a:spLocks noGrp="1"/>
+          </p:cNvSpPr>
+          <p:nvPr>
+            <p:ph type="sldNum" sz="quarter" idx="5"/>
+          </p:nvPr>
+        </p:nvSpPr>
+        <p:spPr/>
+        <p:txBody>
+          <a:bodyPr/>
+          <a:lstStyle/>
+          <a:p>
+            <a:fld id="{4D94949D-2744-2049-A342-6D0F93C09BCD}" type="slidenum">
+              <a:rPr lang="en-US" smtClean="0"/>
+              <a:t>2</a:t>
+            </a:fld>
+            <a:endParaRPr lang="en-US"/>
+          </a:p>
+        </p:txBody>
+      </p:sp>
+    </p:spTree>
+    <p:extLst>
+      <p:ext uri="{BB962C8B-B14F-4D97-AF65-F5344CB8AC3E}">
+        <p14:creationId xmlns:p14="http://schemas.microsoft.com/office/powerpoint/2010/main" val="2641142243"/>
+      </p:ext>
+    </p:extLst>
+  </p:cSld>
+  <p:clrMapOvr>
+    <a:masterClrMapping/>
+  </p:clrMapOvr>
+</p:notes>
+</file>
+
+<file path=ppt/notesSlides/notesSlide3.xml><?xml version="1.0" encoding="utf-8"?>
+<p:notes xmlns:a="http://schemas.openxmlformats.org/drawingml/2006/main" xmlns:r="http://schemas.openxmlformats.org/officeDocument/2006/relationships" xmlns:p="http://schemas.openxmlformats.org/presentationml/2006/main">
+  <p:cSld>
+    <p:spTree>
+      <p:nvGrpSpPr>
+        <p:cNvPr id="1" name=""/>
+        <p:cNvGrpSpPr/>
+        <p:nvPr/>
+      </p:nvGrpSpPr>
+      <p:grpSpPr>
+        <a:xfrm>
+          <a:off x="0" y="0"/>
+          <a:ext cx="0" cy="0"/>
+          <a:chOff x="0" y="0"/>
+          <a:chExt cx="0" cy="0"/>
+        </a:xfrm>
+      </p:grpSpPr>
+      <p:sp>
+        <p:nvSpPr>
+          <p:cNvPr id="2" name="Slide Image Placeholder 1"/>
+          <p:cNvSpPr>
+            <a:spLocks noGrp="1" noRot="1" noChangeAspect="1"/>
+          </p:cNvSpPr>
+          <p:nvPr>
+            <p:ph type="sldImg"/>
+          </p:nvPr>
+        </p:nvSpPr>
+        <p:spPr/>
+      </p:sp>
+      <p:sp>
+        <p:nvSpPr>
+          <p:cNvPr id="3" name="Notes Placeholder 2"/>
+          <p:cNvSpPr>
+            <a:spLocks noGrp="1"/>
+          </p:cNvSpPr>
+          <p:nvPr>
+            <p:ph type="body" idx="1"/>
+          </p:nvPr>
+        </p:nvSpPr>
+        <p:spPr/>
+        <p:txBody>
+          <a:bodyPr/>
+          <a:lstStyle/>
+          <a:p>
+            <a:pPr>
+              <a:lnSpc>
+                <a:spcPct val="90000"/>
+              </a:lnSpc>
+            </a:pPr>
+            <a:r>
+              <a:rPr lang="en-US" sz="1200" dirty="0"/>
+              <a:t>As shown in the visualizations below, it can be inferred that Males tend to drive more recklessly than Females.</a:t>
+            </a:r>
+          </a:p>
+          <a:p>
+            <a:pPr>
+              <a:lnSpc>
+                <a:spcPct val="90000"/>
+              </a:lnSpc>
+            </a:pPr>
+            <a:r>
+              <a:rPr lang="en-US" sz="1200" dirty="0"/>
+              <a:t>Fatal Injuries tend to occur in Male Senior Drivers than any other Age Group.</a:t>
+            </a:r>
+          </a:p>
+          <a:p>
+            <a:pPr>
+              <a:lnSpc>
+                <a:spcPct val="90000"/>
+              </a:lnSpc>
+            </a:pPr>
+            <a:r>
+              <a:rPr lang="en-US" sz="1200" dirty="0"/>
+              <a:t>Male adults aged 50 and up tend to have much more total accidents than both the &lt;18 and 19-29 age groups combined.</a:t>
+            </a:r>
+          </a:p>
+          <a:p>
+            <a:pPr>
+              <a:lnSpc>
+                <a:spcPct val="90000"/>
+              </a:lnSpc>
+            </a:pPr>
+            <a:r>
+              <a:rPr lang="en-US" sz="1200" dirty="0"/>
+              <a:t>Surprisingly, the &lt;18 age group has significantly less accidents than every other age group, which could be caused by teens delaying getting a driver license or a stricter rules imposed by local authorities.</a:t>
+            </a:r>
+          </a:p>
+          <a:p>
+            <a:pPr>
+              <a:lnSpc>
+                <a:spcPct val="90000"/>
+              </a:lnSpc>
+            </a:pPr>
+            <a:r>
+              <a:rPr lang="en-US" sz="1200" dirty="0"/>
+              <a:t>Although many accidents occur each year, over half of them, regardless of gender or age, result in No Injury.</a:t>
+            </a:r>
+          </a:p>
+          <a:p>
+            <a:endParaRPr lang="en-US" dirty="0"/>
+          </a:p>
+        </p:txBody>
+      </p:sp>
+      <p:sp>
+        <p:nvSpPr>
+          <p:cNvPr id="4" name="Slide Number Placeholder 3"/>
+          <p:cNvSpPr>
+            <a:spLocks noGrp="1"/>
+          </p:cNvSpPr>
+          <p:nvPr>
+            <p:ph type="sldNum" sz="quarter" idx="5"/>
+          </p:nvPr>
+        </p:nvSpPr>
+        <p:spPr/>
+        <p:txBody>
+          <a:bodyPr/>
+          <a:lstStyle/>
+          <a:p>
+            <a:fld id="{4D94949D-2744-2049-A342-6D0F93C09BCD}" type="slidenum">
+              <a:rPr lang="en-US" smtClean="0"/>
+              <a:t>4</a:t>
+            </a:fld>
+            <a:endParaRPr lang="en-US"/>
+          </a:p>
+        </p:txBody>
+      </p:sp>
+    </p:spTree>
+    <p:extLst>
+      <p:ext uri="{BB962C8B-B14F-4D97-AF65-F5344CB8AC3E}">
+        <p14:creationId xmlns:p14="http://schemas.microsoft.com/office/powerpoint/2010/main" val="1771630199"/>
+      </p:ext>
+    </p:extLst>
+  </p:cSld>
+  <p:clrMapOvr>
+    <a:masterClrMapping/>
+  </p:clrMapOvr>
+</p:notes>
 </file>
 
 <file path=ppt/slideLayouts/slideLayout1.xml><?xml version="1.0" encoding="utf-8"?>
@@ -8815,19 +9506,67 @@
         <p:spPr/>
         <p:txBody>
           <a:bodyPr>
-            <a:normAutofit/>
+            <a:normAutofit fontScale="92500" lnSpcReduction="20000"/>
           </a:bodyPr>
           <a:lstStyle/>
           <a:p>
             <a:r>
               <a:rPr lang="en-US" dirty="0"/>
-              <a:t>We utilize the dataset that contains the crash report managed by the National Highway Traffic Safety Administration (NHTSA) of the US Department of Transportation in 2019.  This dataset includes information such as the injury severity, the age &amp; gender of persons involved, the vehicle information, and the accident time and location by US region.</a:t>
+              <a:t>National Highway Traffic Safety Administration (NHTSA) of the US Department of Transportation in 2018</a:t>
             </a:r>
           </a:p>
           <a:p>
             <a:r>
               <a:rPr lang="en-US" dirty="0"/>
-              <a:t>We use visualization method and summary statistics to explore the data analytics.  The objective is to understand the data, discover patterns, and to establish the relationships between the data elements. </a:t>
+              <a:t>Includes:</a:t>
+            </a:r>
+          </a:p>
+          <a:p>
+            <a:pPr lvl="1"/>
+            <a:r>
+              <a:rPr lang="en-US" dirty="0"/>
+              <a:t>Injury Severity</a:t>
+            </a:r>
+          </a:p>
+          <a:p>
+            <a:pPr lvl="1"/>
+            <a:r>
+              <a:rPr lang="en-US" dirty="0"/>
+              <a:t>Age</a:t>
+            </a:r>
+          </a:p>
+          <a:p>
+            <a:pPr lvl="1"/>
+            <a:r>
+              <a:rPr lang="en-US" dirty="0"/>
+              <a:t>Gender</a:t>
+            </a:r>
+          </a:p>
+          <a:p>
+            <a:r>
+              <a:rPr lang="en-US" dirty="0"/>
+              <a:t>Objective:</a:t>
+            </a:r>
+          </a:p>
+          <a:p>
+            <a:pPr lvl="1"/>
+            <a:r>
+              <a:rPr lang="en-US" dirty="0"/>
+              <a:t>Understand Data</a:t>
+            </a:r>
+          </a:p>
+          <a:p>
+            <a:pPr lvl="1"/>
+            <a:r>
+              <a:rPr lang="en-US" dirty="0"/>
+              <a:t>Discover Patterns</a:t>
+            </a:r>
+          </a:p>
+          <a:p>
+            <a:pPr lvl="1"/>
+            <a:r>
+              <a:rPr lang="en-US" dirty="0"/>
+              <a:t>Establish Relationships Between Data Elements</a:t>
             </a:r>
           </a:p>
           <a:p>
@@ -8973,7 +9712,7 @@
             <p:ph idx="1"/>
             <p:extLst>
               <p:ext uri="{D42A27DB-BD31-4B8C-83A1-F6EECF244321}">
-                <p14:modId xmlns:p14="http://schemas.microsoft.com/office/powerpoint/2010/main" val="4233973983"/>
+                <p14:modId xmlns:p14="http://schemas.microsoft.com/office/powerpoint/2010/main" val="2854051222"/>
               </p:ext>
             </p:extLst>
           </p:nvPr>
@@ -9006,1174 +9745,8 @@
   <p:cSld>
     <p:bg>
       <p:bgPr>
-        <a:solidFill>
-          <a:schemeClr val="bg1"/>
-        </a:solidFill>
-        <a:effectLst/>
-      </p:bgPr>
-    </p:bg>
-    <p:spTree>
-      <p:nvGrpSpPr>
-        <p:cNvPr id="1" name=""/>
-        <p:cNvGrpSpPr/>
-        <p:nvPr/>
-      </p:nvGrpSpPr>
-      <p:grpSpPr>
-        <a:xfrm>
-          <a:off x="0" y="0"/>
-          <a:ext cx="0" cy="0"/>
-          <a:chOff x="0" y="0"/>
-          <a:chExt cx="0" cy="0"/>
-        </a:xfrm>
-      </p:grpSpPr>
-      <p:sp>
-        <p:nvSpPr>
-          <p:cNvPr id="19" name="Rectangle 18">
-            <a:extLst>
-              <a:ext uri="{FF2B5EF4-FFF2-40B4-BE49-F238E27FC236}">
-                <a16:creationId xmlns:a16="http://schemas.microsoft.com/office/drawing/2014/main" id="{74CD14DB-BB81-479F-A1FC-1C75640E9F84}"/>
-              </a:ext>
-              <a:ext uri="{C183D7F6-B498-43B3-948B-1728B52AA6E4}">
-                <adec:decorative xmlns:adec="http://schemas.microsoft.com/office/drawing/2017/decorative" val="1"/>
-              </a:ext>
-            </a:extLst>
-          </p:cNvPr>
-          <p:cNvSpPr>
-            <a:spLocks noGrp="1" noRot="1" noChangeAspect="1" noMove="1" noResize="1" noEditPoints="1" noAdjustHandles="1" noChangeArrowheads="1" noChangeShapeType="1" noTextEdit="1"/>
-          </p:cNvSpPr>
-          <p:nvPr>
-            <p:extLst>
-              <p:ext uri="{386F3935-93C4-4BCD-93E2-E3B085C9AB24}">
-                <p16:designElem xmlns:p16="http://schemas.microsoft.com/office/powerpoint/2015/main" val="1"/>
-              </p:ext>
-            </p:extLst>
-          </p:nvPr>
-        </p:nvSpPr>
-        <p:spPr>
-          <a:xfrm>
-            <a:off x="0" y="0"/>
-            <a:ext cx="12192000" cy="6858000"/>
-          </a:xfrm>
-          <a:prstGeom prst="rect">
-            <a:avLst/>
-          </a:prstGeom>
-          <a:ln>
-            <a:noFill/>
-          </a:ln>
-        </p:spPr>
-        <p:style>
-          <a:lnRef idx="2">
-            <a:schemeClr val="accent1">
-              <a:shade val="50000"/>
-            </a:schemeClr>
-          </a:lnRef>
-          <a:fillRef idx="1003">
-            <a:schemeClr val="dk2"/>
-          </a:fillRef>
-          <a:effectRef idx="0">
-            <a:schemeClr val="accent1"/>
-          </a:effectRef>
-          <a:fontRef idx="minor">
-            <a:schemeClr val="lt1"/>
-          </a:fontRef>
-        </p:style>
-        <p:txBody>
-          <a:bodyPr rtlCol="0" anchor="ctr"/>
-          <a:lstStyle/>
-          <a:p>
-            <a:pPr marL="0" marR="0" lvl="0" indent="0" algn="ctr" defTabSz="914400" rtl="0" eaLnBrk="1" fontAlgn="auto" latinLnBrk="0" hangingPunct="1">
-              <a:lnSpc>
-                <a:spcPct val="100000"/>
-              </a:lnSpc>
-              <a:spcBef>
-                <a:spcPts val="0"/>
-              </a:spcBef>
-              <a:spcAft>
-                <a:spcPts val="0"/>
-              </a:spcAft>
-              <a:buClrTx/>
-              <a:buSzTx/>
-              <a:buFontTx/>
-              <a:buNone/>
-              <a:tabLst/>
-              <a:defRPr/>
-            </a:pPr>
-            <a:endParaRPr kumimoji="0" lang="en-US" sz="1800" b="0" i="0" u="none" strike="noStrike" kern="1200" cap="none" spc="0" normalizeH="0" baseline="0" noProof="0">
-              <a:ln>
-                <a:noFill/>
-              </a:ln>
-              <a:solidFill>
-                <a:prstClr val="white"/>
-              </a:solidFill>
-              <a:effectLst/>
-              <a:uLnTx/>
-              <a:uFillTx/>
-              <a:latin typeface="Century Gothic" panose="020B0502020202020204"/>
-              <a:ea typeface="+mn-ea"/>
-              <a:cs typeface="+mn-cs"/>
-            </a:endParaRPr>
-          </a:p>
-        </p:txBody>
-      </p:sp>
-      <p:sp>
-        <p:nvSpPr>
-          <p:cNvPr id="21" name="Rectangle 20">
-            <a:extLst>
-              <a:ext uri="{FF2B5EF4-FFF2-40B4-BE49-F238E27FC236}">
-                <a16:creationId xmlns:a16="http://schemas.microsoft.com/office/drawing/2014/main" id="{C943A91B-7CA7-4592-A975-73B1BF8C4C74}"/>
-              </a:ext>
-              <a:ext uri="{C183D7F6-B498-43B3-948B-1728B52AA6E4}">
-                <adec:decorative xmlns:adec="http://schemas.microsoft.com/office/drawing/2017/decorative" val="1"/>
-              </a:ext>
-            </a:extLst>
-          </p:cNvPr>
-          <p:cNvSpPr>
-            <a:spLocks noGrp="1" noRot="1" noChangeAspect="1" noMove="1" noResize="1" noEditPoints="1" noAdjustHandles="1" noChangeArrowheads="1" noChangeShapeType="1" noTextEdit="1"/>
-          </p:cNvSpPr>
-          <p:nvPr>
-            <p:extLst>
-              <p:ext uri="{386F3935-93C4-4BCD-93E2-E3B085C9AB24}">
-                <p16:designElem xmlns:p16="http://schemas.microsoft.com/office/powerpoint/2015/main" val="1"/>
-              </p:ext>
-            </p:extLst>
-          </p:nvPr>
-        </p:nvSpPr>
-        <p:spPr>
-          <a:xfrm>
-            <a:off x="10437812" y="0"/>
-            <a:ext cx="685800" cy="1143000"/>
-          </a:xfrm>
-          <a:prstGeom prst="rect">
-            <a:avLst/>
-          </a:prstGeom>
-          <a:solidFill>
-            <a:schemeClr val="accent1"/>
-          </a:solidFill>
-          <a:ln>
-            <a:noFill/>
-          </a:ln>
-        </p:spPr>
-        <p:style>
-          <a:lnRef idx="1">
-            <a:schemeClr val="accent1"/>
-          </a:lnRef>
-          <a:fillRef idx="3">
-            <a:schemeClr val="accent1"/>
-          </a:fillRef>
-          <a:effectRef idx="2">
-            <a:schemeClr val="accent1"/>
-          </a:effectRef>
-          <a:fontRef idx="minor">
-            <a:schemeClr val="lt1"/>
-          </a:fontRef>
-        </p:style>
-      </p:sp>
-      <p:sp>
-        <p:nvSpPr>
-          <p:cNvPr id="23" name="Freeform 7">
-            <a:extLst>
-              <a:ext uri="{FF2B5EF4-FFF2-40B4-BE49-F238E27FC236}">
-                <a16:creationId xmlns:a16="http://schemas.microsoft.com/office/drawing/2014/main" id="{EC471314-E46A-414B-8D91-74880E84F187}"/>
-              </a:ext>
-              <a:ext uri="{C183D7F6-B498-43B3-948B-1728B52AA6E4}">
-                <adec:decorative xmlns:adec="http://schemas.microsoft.com/office/drawing/2017/decorative" val="1"/>
-              </a:ext>
-            </a:extLst>
-          </p:cNvPr>
-          <p:cNvSpPr>
-            <a:spLocks noGrp="1" noRot="1" noChangeAspect="1" noMove="1" noResize="1" noEditPoints="1" noAdjustHandles="1" noChangeArrowheads="1" noChangeShapeType="1" noTextEdit="1"/>
-          </p:cNvSpPr>
-          <p:nvPr>
-            <p:extLst>
-              <p:ext uri="{386F3935-93C4-4BCD-93E2-E3B085C9AB24}">
-                <p16:designElem xmlns:p16="http://schemas.microsoft.com/office/powerpoint/2015/main" val="1"/>
-              </p:ext>
-            </p:extLst>
-          </p:nvPr>
-        </p:nvSpPr>
-        <p:spPr>
-          <a:xfrm>
-            <a:off x="8719939" y="1460230"/>
-            <a:ext cx="3472060" cy="825932"/>
-          </a:xfrm>
-          <a:custGeom>
-            <a:avLst/>
-            <a:gdLst>
-              <a:gd name="connsiteX0" fmla="*/ 3470310 w 3472060"/>
-              <a:gd name="connsiteY0" fmla="*/ 0 h 825932"/>
-              <a:gd name="connsiteX1" fmla="*/ 3472060 w 3472060"/>
-              <a:gd name="connsiteY1" fmla="*/ 12850 h 825932"/>
-              <a:gd name="connsiteX2" fmla="*/ 3472060 w 3472060"/>
-              <a:gd name="connsiteY2" fmla="*/ 480529 h 825932"/>
-              <a:gd name="connsiteX3" fmla="*/ 3363699 w 3472060"/>
-              <a:gd name="connsiteY3" fmla="*/ 498471 h 825932"/>
-              <a:gd name="connsiteX4" fmla="*/ 42060 w 3472060"/>
-              <a:gd name="connsiteY4" fmla="*/ 824486 h 825932"/>
-              <a:gd name="connsiteX5" fmla="*/ 0 w 3472060"/>
-              <a:gd name="connsiteY5" fmla="*/ 758452 h 825932"/>
-              <a:gd name="connsiteX6" fmla="*/ 188014 w 3472060"/>
-              <a:gd name="connsiteY6" fmla="*/ 735602 h 825932"/>
-              <a:gd name="connsiteX7" fmla="*/ 284087 w 3472060"/>
-              <a:gd name="connsiteY7" fmla="*/ 722590 h 825932"/>
-              <a:gd name="connsiteX8" fmla="*/ 382288 w 3472060"/>
-              <a:gd name="connsiteY8" fmla="*/ 709392 h 825932"/>
-              <a:gd name="connsiteX9" fmla="*/ 481858 w 3472060"/>
-              <a:gd name="connsiteY9" fmla="*/ 695774 h 825932"/>
-              <a:gd name="connsiteX10" fmla="*/ 581897 w 3472060"/>
-              <a:gd name="connsiteY10" fmla="*/ 680711 h 825932"/>
-              <a:gd name="connsiteX11" fmla="*/ 683670 w 3472060"/>
-              <a:gd name="connsiteY11" fmla="*/ 665256 h 825932"/>
-              <a:gd name="connsiteX12" fmla="*/ 787206 w 3472060"/>
-              <a:gd name="connsiteY12" fmla="*/ 649587 h 825932"/>
-              <a:gd name="connsiteX13" fmla="*/ 892019 w 3472060"/>
-              <a:gd name="connsiteY13" fmla="*/ 632968 h 825932"/>
-              <a:gd name="connsiteX14" fmla="*/ 997620 w 3472060"/>
-              <a:gd name="connsiteY14" fmla="*/ 614667 h 825932"/>
-              <a:gd name="connsiteX15" fmla="*/ 1104727 w 3472060"/>
-              <a:gd name="connsiteY15" fmla="*/ 596741 h 825932"/>
-              <a:gd name="connsiteX16" fmla="*/ 1212669 w 3472060"/>
-              <a:gd name="connsiteY16" fmla="*/ 577397 h 825932"/>
-              <a:gd name="connsiteX17" fmla="*/ 1321506 w 3472060"/>
-              <a:gd name="connsiteY17" fmla="*/ 556988 h 825932"/>
-              <a:gd name="connsiteX18" fmla="*/ 1430709 w 3472060"/>
-              <a:gd name="connsiteY18" fmla="*/ 536607 h 825932"/>
-              <a:gd name="connsiteX19" fmla="*/ 1541050 w 3472060"/>
-              <a:gd name="connsiteY19" fmla="*/ 514481 h 825932"/>
-              <a:gd name="connsiteX20" fmla="*/ 1652805 w 3472060"/>
-              <a:gd name="connsiteY20" fmla="*/ 492202 h 825932"/>
-              <a:gd name="connsiteX21" fmla="*/ 1763708 w 3472060"/>
-              <a:gd name="connsiteY21" fmla="*/ 469161 h 825932"/>
-              <a:gd name="connsiteX22" fmla="*/ 1875795 w 3472060"/>
-              <a:gd name="connsiteY22" fmla="*/ 444641 h 825932"/>
-              <a:gd name="connsiteX23" fmla="*/ 1989128 w 3472060"/>
-              <a:gd name="connsiteY23" fmla="*/ 418995 h 825932"/>
-              <a:gd name="connsiteX24" fmla="*/ 2102476 w 3472060"/>
-              <a:gd name="connsiteY24" fmla="*/ 393438 h 825932"/>
-              <a:gd name="connsiteX25" fmla="*/ 2215549 w 3472060"/>
-              <a:gd name="connsiteY25" fmla="*/ 366291 h 825932"/>
-              <a:gd name="connsiteX26" fmla="*/ 2330490 w 3472060"/>
-              <a:gd name="connsiteY26" fmla="*/ 337455 h 825932"/>
-              <a:gd name="connsiteX27" fmla="*/ 2443333 w 3472060"/>
-              <a:gd name="connsiteY27" fmla="*/ 308983 h 825932"/>
-              <a:gd name="connsiteX28" fmla="*/ 2558014 w 3472060"/>
-              <a:gd name="connsiteY28" fmla="*/ 278646 h 825932"/>
-              <a:gd name="connsiteX29" fmla="*/ 2673621 w 3472060"/>
-              <a:gd name="connsiteY29" fmla="*/ 247421 h 825932"/>
-              <a:gd name="connsiteX30" fmla="*/ 2787008 w 3472060"/>
-              <a:gd name="connsiteY30" fmla="*/ 215853 h 825932"/>
-              <a:gd name="connsiteX31" fmla="*/ 2901442 w 3472060"/>
-              <a:gd name="connsiteY31" fmla="*/ 182011 h 825932"/>
-              <a:gd name="connsiteX32" fmla="*/ 3015722 w 3472060"/>
-              <a:gd name="connsiteY32" fmla="*/ 147286 h 825932"/>
-              <a:gd name="connsiteX33" fmla="*/ 3130018 w 3472060"/>
-              <a:gd name="connsiteY33" fmla="*/ 112649 h 825932"/>
-              <a:gd name="connsiteX34" fmla="*/ 3243551 w 3472060"/>
-              <a:gd name="connsiteY34" fmla="*/ 75688 h 825932"/>
-              <a:gd name="connsiteX35" fmla="*/ 3356992 w 3472060"/>
-              <a:gd name="connsiteY35" fmla="*/ 38197 h 825932"/>
-              <a:gd name="connsiteX36" fmla="*/ 3470310 w 3472060"/>
-              <a:gd name="connsiteY36" fmla="*/ 0 h 825932"/>
-            </a:gdLst>
-            <a:ahLst/>
-            <a:cxnLst>
-              <a:cxn ang="0">
-                <a:pos x="connsiteX0" y="connsiteY0"/>
-              </a:cxn>
-              <a:cxn ang="0">
-                <a:pos x="connsiteX1" y="connsiteY1"/>
-              </a:cxn>
-              <a:cxn ang="0">
-                <a:pos x="connsiteX2" y="connsiteY2"/>
-              </a:cxn>
-              <a:cxn ang="0">
-                <a:pos x="connsiteX3" y="connsiteY3"/>
-              </a:cxn>
-              <a:cxn ang="0">
-                <a:pos x="connsiteX4" y="connsiteY4"/>
-              </a:cxn>
-              <a:cxn ang="0">
-                <a:pos x="connsiteX5" y="connsiteY5"/>
-              </a:cxn>
-              <a:cxn ang="0">
-                <a:pos x="connsiteX6" y="connsiteY6"/>
-              </a:cxn>
-              <a:cxn ang="0">
-                <a:pos x="connsiteX7" y="connsiteY7"/>
-              </a:cxn>
-              <a:cxn ang="0">
-                <a:pos x="connsiteX8" y="connsiteY8"/>
-              </a:cxn>
-              <a:cxn ang="0">
-                <a:pos x="connsiteX9" y="connsiteY9"/>
-              </a:cxn>
-              <a:cxn ang="0">
-                <a:pos x="connsiteX10" y="connsiteY10"/>
-              </a:cxn>
-              <a:cxn ang="0">
-                <a:pos x="connsiteX11" y="connsiteY11"/>
-              </a:cxn>
-              <a:cxn ang="0">
-                <a:pos x="connsiteX12" y="connsiteY12"/>
-              </a:cxn>
-              <a:cxn ang="0">
-                <a:pos x="connsiteX13" y="connsiteY13"/>
-              </a:cxn>
-              <a:cxn ang="0">
-                <a:pos x="connsiteX14" y="connsiteY14"/>
-              </a:cxn>
-              <a:cxn ang="0">
-                <a:pos x="connsiteX15" y="connsiteY15"/>
-              </a:cxn>
-              <a:cxn ang="0">
-                <a:pos x="connsiteX16" y="connsiteY16"/>
-              </a:cxn>
-              <a:cxn ang="0">
-                <a:pos x="connsiteX17" y="connsiteY17"/>
-              </a:cxn>
-              <a:cxn ang="0">
-                <a:pos x="connsiteX18" y="connsiteY18"/>
-              </a:cxn>
-              <a:cxn ang="0">
-                <a:pos x="connsiteX19" y="connsiteY19"/>
-              </a:cxn>
-              <a:cxn ang="0">
-                <a:pos x="connsiteX20" y="connsiteY20"/>
-              </a:cxn>
-              <a:cxn ang="0">
-                <a:pos x="connsiteX21" y="connsiteY21"/>
-              </a:cxn>
-              <a:cxn ang="0">
-                <a:pos x="connsiteX22" y="connsiteY22"/>
-              </a:cxn>
-              <a:cxn ang="0">
-                <a:pos x="connsiteX23" y="connsiteY23"/>
-              </a:cxn>
-              <a:cxn ang="0">
-                <a:pos x="connsiteX24" y="connsiteY24"/>
-              </a:cxn>
-              <a:cxn ang="0">
-                <a:pos x="connsiteX25" y="connsiteY25"/>
-              </a:cxn>
-              <a:cxn ang="0">
-                <a:pos x="connsiteX26" y="connsiteY26"/>
-              </a:cxn>
-              <a:cxn ang="0">
-                <a:pos x="connsiteX27" y="connsiteY27"/>
-              </a:cxn>
-              <a:cxn ang="0">
-                <a:pos x="connsiteX28" y="connsiteY28"/>
-              </a:cxn>
-              <a:cxn ang="0">
-                <a:pos x="connsiteX29" y="connsiteY29"/>
-              </a:cxn>
-              <a:cxn ang="0">
-                <a:pos x="connsiteX30" y="connsiteY30"/>
-              </a:cxn>
-              <a:cxn ang="0">
-                <a:pos x="connsiteX31" y="connsiteY31"/>
-              </a:cxn>
-              <a:cxn ang="0">
-                <a:pos x="connsiteX32" y="connsiteY32"/>
-              </a:cxn>
-              <a:cxn ang="0">
-                <a:pos x="connsiteX33" y="connsiteY33"/>
-              </a:cxn>
-              <a:cxn ang="0">
-                <a:pos x="connsiteX34" y="connsiteY34"/>
-              </a:cxn>
-              <a:cxn ang="0">
-                <a:pos x="connsiteX35" y="connsiteY35"/>
-              </a:cxn>
-              <a:cxn ang="0">
-                <a:pos x="connsiteX36" y="connsiteY36"/>
-              </a:cxn>
-            </a:cxnLst>
-            <a:rect l="l" t="t" r="r" b="b"/>
-            <a:pathLst>
-              <a:path w="3472060" h="825932">
-                <a:moveTo>
-                  <a:pt x="3470310" y="0"/>
-                </a:moveTo>
-                <a:lnTo>
-                  <a:pt x="3472060" y="12850"/>
-                </a:lnTo>
-                <a:lnTo>
-                  <a:pt x="3472060" y="480529"/>
-                </a:lnTo>
-                <a:lnTo>
-                  <a:pt x="3363699" y="498471"/>
-                </a:lnTo>
-                <a:cubicBezTo>
-                  <a:pt x="2435623" y="645518"/>
-                  <a:pt x="603076" y="844866"/>
-                  <a:pt x="42060" y="824486"/>
-                </a:cubicBezTo>
-                <a:cubicBezTo>
-                  <a:pt x="28151" y="802425"/>
-                  <a:pt x="13909" y="780513"/>
-                  <a:pt x="0" y="758452"/>
-                </a:cubicBezTo>
-                <a:lnTo>
-                  <a:pt x="188014" y="735602"/>
-                </a:lnTo>
-                <a:lnTo>
-                  <a:pt x="284087" y="722590"/>
-                </a:lnTo>
-                <a:lnTo>
-                  <a:pt x="382288" y="709392"/>
-                </a:lnTo>
-                <a:lnTo>
-                  <a:pt x="481858" y="695774"/>
-                </a:lnTo>
-                <a:lnTo>
-                  <a:pt x="581897" y="680711"/>
-                </a:lnTo>
-                <a:lnTo>
-                  <a:pt x="683670" y="665256"/>
-                </a:lnTo>
-                <a:lnTo>
-                  <a:pt x="787206" y="649587"/>
-                </a:lnTo>
-                <a:lnTo>
-                  <a:pt x="892019" y="632968"/>
-                </a:lnTo>
-                <a:lnTo>
-                  <a:pt x="997620" y="614667"/>
-                </a:lnTo>
-                <a:lnTo>
-                  <a:pt x="1104727" y="596741"/>
-                </a:lnTo>
-                <a:lnTo>
-                  <a:pt x="1212669" y="577397"/>
-                </a:lnTo>
-                <a:lnTo>
-                  <a:pt x="1321506" y="556988"/>
-                </a:lnTo>
-                <a:lnTo>
-                  <a:pt x="1430709" y="536607"/>
-                </a:lnTo>
-                <a:lnTo>
-                  <a:pt x="1541050" y="514481"/>
-                </a:lnTo>
-                <a:lnTo>
-                  <a:pt x="1652805" y="492202"/>
-                </a:lnTo>
-                <a:lnTo>
-                  <a:pt x="1763708" y="469161"/>
-                </a:lnTo>
-                <a:lnTo>
-                  <a:pt x="1875795" y="444641"/>
-                </a:lnTo>
-                <a:lnTo>
-                  <a:pt x="1989128" y="418995"/>
-                </a:lnTo>
-                <a:lnTo>
-                  <a:pt x="2102476" y="393438"/>
-                </a:lnTo>
-                <a:lnTo>
-                  <a:pt x="2215549" y="366291"/>
-                </a:lnTo>
-                <a:lnTo>
-                  <a:pt x="2330490" y="337455"/>
-                </a:lnTo>
-                <a:lnTo>
-                  <a:pt x="2443333" y="308983"/>
-                </a:lnTo>
-                <a:lnTo>
-                  <a:pt x="2558014" y="278646"/>
-                </a:lnTo>
-                <a:lnTo>
-                  <a:pt x="2673621" y="247421"/>
-                </a:lnTo>
-                <a:lnTo>
-                  <a:pt x="2787008" y="215853"/>
-                </a:lnTo>
-                <a:lnTo>
-                  <a:pt x="2901442" y="182011"/>
-                </a:lnTo>
-                <a:lnTo>
-                  <a:pt x="3015722" y="147286"/>
-                </a:lnTo>
-                <a:lnTo>
-                  <a:pt x="3130018" y="112649"/>
-                </a:lnTo>
-                <a:lnTo>
-                  <a:pt x="3243551" y="75688"/>
-                </a:lnTo>
-                <a:lnTo>
-                  <a:pt x="3356992" y="38197"/>
-                </a:lnTo>
-                <a:lnTo>
-                  <a:pt x="3470310" y="0"/>
-                </a:lnTo>
-                <a:close/>
-              </a:path>
-            </a:pathLst>
-          </a:custGeom>
-          <a:solidFill>
-            <a:schemeClr val="bg1">
-              <a:alpha val="20000"/>
-            </a:schemeClr>
-          </a:solidFill>
-          <a:ln>
-            <a:noFill/>
-          </a:ln>
-        </p:spPr>
-        <p:txBody>
-          <a:bodyPr rtlCol="0" anchor="ctr"/>
-          <a:lstStyle/>
-          <a:p>
-            <a:pPr marL="0" marR="0" lvl="0" indent="0" algn="ctr" defTabSz="914400" rtl="0" eaLnBrk="1" fontAlgn="auto" latinLnBrk="0" hangingPunct="1">
-              <a:lnSpc>
-                <a:spcPct val="100000"/>
-              </a:lnSpc>
-              <a:spcBef>
-                <a:spcPts val="0"/>
-              </a:spcBef>
-              <a:spcAft>
-                <a:spcPts val="0"/>
-              </a:spcAft>
-              <a:buClrTx/>
-              <a:buSzTx/>
-              <a:buFontTx/>
-              <a:buNone/>
-              <a:tabLst/>
-              <a:defRPr/>
-            </a:pPr>
-            <a:endParaRPr kumimoji="0" lang="en-US" sz="1800" b="0" i="0" u="none" strike="noStrike" kern="1200" cap="none" spc="0" normalizeH="0" baseline="0" noProof="0">
-              <a:ln>
-                <a:noFill/>
-              </a:ln>
-              <a:solidFill>
-                <a:prstClr val="black"/>
-              </a:solidFill>
-              <a:effectLst/>
-              <a:uLnTx/>
-              <a:uFillTx/>
-              <a:latin typeface="Century Gothic" panose="020B0502020202020204"/>
-              <a:ea typeface="+mn-ea"/>
-              <a:cs typeface="+mn-cs"/>
-            </a:endParaRPr>
-          </a:p>
-        </p:txBody>
-      </p:sp>
-      <p:sp useBgFill="1">
-        <p:nvSpPr>
-          <p:cNvPr id="25" name="Freeform: Shape 24">
-            <a:extLst>
-              <a:ext uri="{FF2B5EF4-FFF2-40B4-BE49-F238E27FC236}">
-                <a16:creationId xmlns:a16="http://schemas.microsoft.com/office/drawing/2014/main" id="{6A681326-1C9D-44A3-A627-3871BDAE4127}"/>
-              </a:ext>
-              <a:ext uri="{C183D7F6-B498-43B3-948B-1728B52AA6E4}">
-                <adec:decorative xmlns:adec="http://schemas.microsoft.com/office/drawing/2017/decorative" val="1"/>
-              </a:ext>
-            </a:extLst>
-          </p:cNvPr>
-          <p:cNvSpPr>
-            <a:spLocks noGrp="1" noRot="1" noChangeAspect="1" noMove="1" noResize="1" noEditPoints="1" noAdjustHandles="1" noChangeArrowheads="1" noChangeShapeType="1" noTextEdit="1"/>
-          </p:cNvSpPr>
-          <p:nvPr>
-            <p:extLst>
-              <p:ext uri="{386F3935-93C4-4BCD-93E2-E3B085C9AB24}">
-                <p16:designElem xmlns:p16="http://schemas.microsoft.com/office/powerpoint/2015/main" val="1"/>
-              </p:ext>
-            </p:extLst>
-          </p:nvPr>
-        </p:nvSpPr>
-        <p:spPr bwMode="gray">
-          <a:xfrm>
-            <a:off x="1" y="1762067"/>
-            <a:ext cx="12192417" cy="5095933"/>
-          </a:xfrm>
-          <a:custGeom>
-            <a:avLst/>
-            <a:gdLst>
-              <a:gd name="connsiteX0" fmla="*/ 0 w 12192417"/>
-              <a:gd name="connsiteY0" fmla="*/ 0 h 5095933"/>
-              <a:gd name="connsiteX1" fmla="*/ 71931 w 12192417"/>
-              <a:gd name="connsiteY1" fmla="*/ 12261 h 5095933"/>
-              <a:gd name="connsiteX2" fmla="*/ 282848 w 12192417"/>
-              <a:gd name="connsiteY2" fmla="*/ 48343 h 5095933"/>
-              <a:gd name="connsiteX3" fmla="*/ 436463 w 12192417"/>
-              <a:gd name="connsiteY3" fmla="*/ 73565 h 5095933"/>
-              <a:gd name="connsiteX4" fmla="*/ 619338 w 12192417"/>
-              <a:gd name="connsiteY4" fmla="*/ 100188 h 5095933"/>
-              <a:gd name="connsiteX5" fmla="*/ 836350 w 12192417"/>
-              <a:gd name="connsiteY5" fmla="*/ 132066 h 5095933"/>
-              <a:gd name="connsiteX6" fmla="*/ 1076527 w 12192417"/>
-              <a:gd name="connsiteY6" fmla="*/ 165696 h 5095933"/>
-              <a:gd name="connsiteX7" fmla="*/ 1347183 w 12192417"/>
-              <a:gd name="connsiteY7" fmla="*/ 201077 h 5095933"/>
-              <a:gd name="connsiteX8" fmla="*/ 1642222 w 12192417"/>
-              <a:gd name="connsiteY8" fmla="*/ 238560 h 5095933"/>
-              <a:gd name="connsiteX9" fmla="*/ 1962863 w 12192417"/>
-              <a:gd name="connsiteY9" fmla="*/ 276043 h 5095933"/>
-              <a:gd name="connsiteX10" fmla="*/ 2304231 w 12192417"/>
-              <a:gd name="connsiteY10" fmla="*/ 314227 h 5095933"/>
-              <a:gd name="connsiteX11" fmla="*/ 2672420 w 12192417"/>
-              <a:gd name="connsiteY11" fmla="*/ 349608 h 5095933"/>
-              <a:gd name="connsiteX12" fmla="*/ 3057677 w 12192417"/>
-              <a:gd name="connsiteY12" fmla="*/ 383588 h 5095933"/>
-              <a:gd name="connsiteX13" fmla="*/ 3464880 w 12192417"/>
-              <a:gd name="connsiteY13" fmla="*/ 414415 h 5095933"/>
-              <a:gd name="connsiteX14" fmla="*/ 3889151 w 12192417"/>
-              <a:gd name="connsiteY14" fmla="*/ 443841 h 5095933"/>
-              <a:gd name="connsiteX15" fmla="*/ 4331709 w 12192417"/>
-              <a:gd name="connsiteY15" fmla="*/ 471515 h 5095933"/>
-              <a:gd name="connsiteX16" fmla="*/ 4558475 w 12192417"/>
-              <a:gd name="connsiteY16" fmla="*/ 481324 h 5095933"/>
-              <a:gd name="connsiteX17" fmla="*/ 4790117 w 12192417"/>
-              <a:gd name="connsiteY17" fmla="*/ 492183 h 5095933"/>
-              <a:gd name="connsiteX18" fmla="*/ 5025417 w 12192417"/>
-              <a:gd name="connsiteY18" fmla="*/ 502342 h 5095933"/>
-              <a:gd name="connsiteX19" fmla="*/ 5261936 w 12192417"/>
-              <a:gd name="connsiteY19" fmla="*/ 508998 h 5095933"/>
-              <a:gd name="connsiteX20" fmla="*/ 5503331 w 12192417"/>
-              <a:gd name="connsiteY20" fmla="*/ 514953 h 5095933"/>
-              <a:gd name="connsiteX21" fmla="*/ 5747166 w 12192417"/>
-              <a:gd name="connsiteY21" fmla="*/ 521259 h 5095933"/>
-              <a:gd name="connsiteX22" fmla="*/ 5995876 w 12192417"/>
-              <a:gd name="connsiteY22" fmla="*/ 525463 h 5095933"/>
-              <a:gd name="connsiteX23" fmla="*/ 6247025 w 12192417"/>
-              <a:gd name="connsiteY23" fmla="*/ 525463 h 5095933"/>
-              <a:gd name="connsiteX24" fmla="*/ 6500612 w 12192417"/>
-              <a:gd name="connsiteY24" fmla="*/ 527565 h 5095933"/>
-              <a:gd name="connsiteX25" fmla="*/ 6756638 w 12192417"/>
-              <a:gd name="connsiteY25" fmla="*/ 525463 h 5095933"/>
-              <a:gd name="connsiteX26" fmla="*/ 7016321 w 12192417"/>
-              <a:gd name="connsiteY26" fmla="*/ 521259 h 5095933"/>
-              <a:gd name="connsiteX27" fmla="*/ 7276004 w 12192417"/>
-              <a:gd name="connsiteY27" fmla="*/ 517406 h 5095933"/>
-              <a:gd name="connsiteX28" fmla="*/ 7539344 w 12192417"/>
-              <a:gd name="connsiteY28" fmla="*/ 508998 h 5095933"/>
-              <a:gd name="connsiteX29" fmla="*/ 7805123 w 12192417"/>
-              <a:gd name="connsiteY29" fmla="*/ 500241 h 5095933"/>
-              <a:gd name="connsiteX30" fmla="*/ 8070902 w 12192417"/>
-              <a:gd name="connsiteY30" fmla="*/ 490082 h 5095933"/>
-              <a:gd name="connsiteX31" fmla="*/ 8339120 w 12192417"/>
-              <a:gd name="connsiteY31" fmla="*/ 475719 h 5095933"/>
-              <a:gd name="connsiteX32" fmla="*/ 8609775 w 12192417"/>
-              <a:gd name="connsiteY32" fmla="*/ 458554 h 5095933"/>
-              <a:gd name="connsiteX33" fmla="*/ 8881650 w 12192417"/>
-              <a:gd name="connsiteY33" fmla="*/ 442089 h 5095933"/>
-              <a:gd name="connsiteX34" fmla="*/ 9153525 w 12192417"/>
-              <a:gd name="connsiteY34" fmla="*/ 421071 h 5095933"/>
-              <a:gd name="connsiteX35" fmla="*/ 9429057 w 12192417"/>
-              <a:gd name="connsiteY35" fmla="*/ 395849 h 5095933"/>
-              <a:gd name="connsiteX36" fmla="*/ 9700932 w 12192417"/>
-              <a:gd name="connsiteY36" fmla="*/ 370626 h 5095933"/>
-              <a:gd name="connsiteX37" fmla="*/ 9977683 w 12192417"/>
-              <a:gd name="connsiteY37" fmla="*/ 341551 h 5095933"/>
-              <a:gd name="connsiteX38" fmla="*/ 10255654 w 12192417"/>
-              <a:gd name="connsiteY38" fmla="*/ 309673 h 5095933"/>
-              <a:gd name="connsiteX39" fmla="*/ 10529967 w 12192417"/>
-              <a:gd name="connsiteY39" fmla="*/ 276043 h 5095933"/>
-              <a:gd name="connsiteX40" fmla="*/ 10807938 w 12192417"/>
-              <a:gd name="connsiteY40" fmla="*/ 236809 h 5095933"/>
-              <a:gd name="connsiteX41" fmla="*/ 11084689 w 12192417"/>
-              <a:gd name="connsiteY41" fmla="*/ 194772 h 5095933"/>
-              <a:gd name="connsiteX42" fmla="*/ 11362660 w 12192417"/>
-              <a:gd name="connsiteY42" fmla="*/ 153085 h 5095933"/>
-              <a:gd name="connsiteX43" fmla="*/ 11639411 w 12192417"/>
-              <a:gd name="connsiteY43" fmla="*/ 104392 h 5095933"/>
-              <a:gd name="connsiteX44" fmla="*/ 11914944 w 12192417"/>
-              <a:gd name="connsiteY44" fmla="*/ 54648 h 5095933"/>
-              <a:gd name="connsiteX45" fmla="*/ 12191695 w 12192417"/>
-              <a:gd name="connsiteY45" fmla="*/ 2452 h 5095933"/>
-              <a:gd name="connsiteX46" fmla="*/ 12191695 w 12192417"/>
-              <a:gd name="connsiteY46" fmla="*/ 2162231 h 5095933"/>
-              <a:gd name="connsiteX47" fmla="*/ 12192417 w 12192417"/>
-              <a:gd name="connsiteY47" fmla="*/ 2162231 h 5095933"/>
-              <a:gd name="connsiteX48" fmla="*/ 12192417 w 12192417"/>
-              <a:gd name="connsiteY48" fmla="*/ 5095933 h 5095933"/>
-              <a:gd name="connsiteX49" fmla="*/ 0 w 12192417"/>
-              <a:gd name="connsiteY49" fmla="*/ 5095933 h 5095933"/>
-              <a:gd name="connsiteX50" fmla="*/ 0 w 12192417"/>
-              <a:gd name="connsiteY50" fmla="*/ 2791958 h 5095933"/>
-              <a:gd name="connsiteX51" fmla="*/ 0 w 12192417"/>
-              <a:gd name="connsiteY51" fmla="*/ 2162231 h 5095933"/>
-            </a:gdLst>
-            <a:ahLst/>
-            <a:cxnLst>
-              <a:cxn ang="0">
-                <a:pos x="connsiteX0" y="connsiteY0"/>
-              </a:cxn>
-              <a:cxn ang="0">
-                <a:pos x="connsiteX1" y="connsiteY1"/>
-              </a:cxn>
-              <a:cxn ang="0">
-                <a:pos x="connsiteX2" y="connsiteY2"/>
-              </a:cxn>
-              <a:cxn ang="0">
-                <a:pos x="connsiteX3" y="connsiteY3"/>
-              </a:cxn>
-              <a:cxn ang="0">
-                <a:pos x="connsiteX4" y="connsiteY4"/>
-              </a:cxn>
-              <a:cxn ang="0">
-                <a:pos x="connsiteX5" y="connsiteY5"/>
-              </a:cxn>
-              <a:cxn ang="0">
-                <a:pos x="connsiteX6" y="connsiteY6"/>
-              </a:cxn>
-              <a:cxn ang="0">
-                <a:pos x="connsiteX7" y="connsiteY7"/>
-              </a:cxn>
-              <a:cxn ang="0">
-                <a:pos x="connsiteX8" y="connsiteY8"/>
-              </a:cxn>
-              <a:cxn ang="0">
-                <a:pos x="connsiteX9" y="connsiteY9"/>
-              </a:cxn>
-              <a:cxn ang="0">
-                <a:pos x="connsiteX10" y="connsiteY10"/>
-              </a:cxn>
-              <a:cxn ang="0">
-                <a:pos x="connsiteX11" y="connsiteY11"/>
-              </a:cxn>
-              <a:cxn ang="0">
-                <a:pos x="connsiteX12" y="connsiteY12"/>
-              </a:cxn>
-              <a:cxn ang="0">
-                <a:pos x="connsiteX13" y="connsiteY13"/>
-              </a:cxn>
-              <a:cxn ang="0">
-                <a:pos x="connsiteX14" y="connsiteY14"/>
-              </a:cxn>
-              <a:cxn ang="0">
-                <a:pos x="connsiteX15" y="connsiteY15"/>
-              </a:cxn>
-              <a:cxn ang="0">
-                <a:pos x="connsiteX16" y="connsiteY16"/>
-              </a:cxn>
-              <a:cxn ang="0">
-                <a:pos x="connsiteX17" y="connsiteY17"/>
-              </a:cxn>
-              <a:cxn ang="0">
-                <a:pos x="connsiteX18" y="connsiteY18"/>
-              </a:cxn>
-              <a:cxn ang="0">
-                <a:pos x="connsiteX19" y="connsiteY19"/>
-              </a:cxn>
-              <a:cxn ang="0">
-                <a:pos x="connsiteX20" y="connsiteY20"/>
-              </a:cxn>
-              <a:cxn ang="0">
-                <a:pos x="connsiteX21" y="connsiteY21"/>
-              </a:cxn>
-              <a:cxn ang="0">
-                <a:pos x="connsiteX22" y="connsiteY22"/>
-              </a:cxn>
-              <a:cxn ang="0">
-                <a:pos x="connsiteX23" y="connsiteY23"/>
-              </a:cxn>
-              <a:cxn ang="0">
-                <a:pos x="connsiteX24" y="connsiteY24"/>
-              </a:cxn>
-              <a:cxn ang="0">
-                <a:pos x="connsiteX25" y="connsiteY25"/>
-              </a:cxn>
-              <a:cxn ang="0">
-                <a:pos x="connsiteX26" y="connsiteY26"/>
-              </a:cxn>
-              <a:cxn ang="0">
-                <a:pos x="connsiteX27" y="connsiteY27"/>
-              </a:cxn>
-              <a:cxn ang="0">
-                <a:pos x="connsiteX28" y="connsiteY28"/>
-              </a:cxn>
-              <a:cxn ang="0">
-                <a:pos x="connsiteX29" y="connsiteY29"/>
-              </a:cxn>
-              <a:cxn ang="0">
-                <a:pos x="connsiteX30" y="connsiteY30"/>
-              </a:cxn>
-              <a:cxn ang="0">
-                <a:pos x="connsiteX31" y="connsiteY31"/>
-              </a:cxn>
-              <a:cxn ang="0">
-                <a:pos x="connsiteX32" y="connsiteY32"/>
-              </a:cxn>
-              <a:cxn ang="0">
-                <a:pos x="connsiteX33" y="connsiteY33"/>
-              </a:cxn>
-              <a:cxn ang="0">
-                <a:pos x="connsiteX34" y="connsiteY34"/>
-              </a:cxn>
-              <a:cxn ang="0">
-                <a:pos x="connsiteX35" y="connsiteY35"/>
-              </a:cxn>
-              <a:cxn ang="0">
-                <a:pos x="connsiteX36" y="connsiteY36"/>
-              </a:cxn>
-              <a:cxn ang="0">
-                <a:pos x="connsiteX37" y="connsiteY37"/>
-              </a:cxn>
-              <a:cxn ang="0">
-                <a:pos x="connsiteX38" y="connsiteY38"/>
-              </a:cxn>
-              <a:cxn ang="0">
-                <a:pos x="connsiteX39" y="connsiteY39"/>
-              </a:cxn>
-              <a:cxn ang="0">
-                <a:pos x="connsiteX40" y="connsiteY40"/>
-              </a:cxn>
-              <a:cxn ang="0">
-                <a:pos x="connsiteX41" y="connsiteY41"/>
-              </a:cxn>
-              <a:cxn ang="0">
-                <a:pos x="connsiteX42" y="connsiteY42"/>
-              </a:cxn>
-              <a:cxn ang="0">
-                <a:pos x="connsiteX43" y="connsiteY43"/>
-              </a:cxn>
-              <a:cxn ang="0">
-                <a:pos x="connsiteX44" y="connsiteY44"/>
-              </a:cxn>
-              <a:cxn ang="0">
-                <a:pos x="connsiteX45" y="connsiteY45"/>
-              </a:cxn>
-              <a:cxn ang="0">
-                <a:pos x="connsiteX46" y="connsiteY46"/>
-              </a:cxn>
-              <a:cxn ang="0">
-                <a:pos x="connsiteX47" y="connsiteY47"/>
-              </a:cxn>
-              <a:cxn ang="0">
-                <a:pos x="connsiteX48" y="connsiteY48"/>
-              </a:cxn>
-              <a:cxn ang="0">
-                <a:pos x="connsiteX49" y="connsiteY49"/>
-              </a:cxn>
-              <a:cxn ang="0">
-                <a:pos x="connsiteX50" y="connsiteY50"/>
-              </a:cxn>
-              <a:cxn ang="0">
-                <a:pos x="connsiteX51" y="connsiteY51"/>
-              </a:cxn>
-            </a:cxnLst>
-            <a:rect l="l" t="t" r="r" b="b"/>
-            <a:pathLst>
-              <a:path w="12192417" h="5095933">
-                <a:moveTo>
-                  <a:pt x="0" y="0"/>
-                </a:moveTo>
-                <a:lnTo>
-                  <a:pt x="71931" y="12261"/>
-                </a:lnTo>
-                <a:lnTo>
-                  <a:pt x="282848" y="48343"/>
-                </a:lnTo>
-                <a:lnTo>
-                  <a:pt x="436463" y="73565"/>
-                </a:lnTo>
-                <a:lnTo>
-                  <a:pt x="619338" y="100188"/>
-                </a:lnTo>
-                <a:lnTo>
-                  <a:pt x="836350" y="132066"/>
-                </a:lnTo>
-                <a:lnTo>
-                  <a:pt x="1076527" y="165696"/>
-                </a:lnTo>
-                <a:lnTo>
-                  <a:pt x="1347183" y="201077"/>
-                </a:lnTo>
-                <a:lnTo>
-                  <a:pt x="1642222" y="238560"/>
-                </a:lnTo>
-                <a:lnTo>
-                  <a:pt x="1962863" y="276043"/>
-                </a:lnTo>
-                <a:lnTo>
-                  <a:pt x="2304231" y="314227"/>
-                </a:lnTo>
-                <a:lnTo>
-                  <a:pt x="2672420" y="349608"/>
-                </a:lnTo>
-                <a:lnTo>
-                  <a:pt x="3057677" y="383588"/>
-                </a:lnTo>
-                <a:lnTo>
-                  <a:pt x="3464880" y="414415"/>
-                </a:lnTo>
-                <a:lnTo>
-                  <a:pt x="3889151" y="443841"/>
-                </a:lnTo>
-                <a:lnTo>
-                  <a:pt x="4331709" y="471515"/>
-                </a:lnTo>
-                <a:lnTo>
-                  <a:pt x="4558475" y="481324"/>
-                </a:lnTo>
-                <a:lnTo>
-                  <a:pt x="4790117" y="492183"/>
-                </a:lnTo>
-                <a:lnTo>
-                  <a:pt x="5025417" y="502342"/>
-                </a:lnTo>
-                <a:lnTo>
-                  <a:pt x="5261936" y="508998"/>
-                </a:lnTo>
-                <a:lnTo>
-                  <a:pt x="5503331" y="514953"/>
-                </a:lnTo>
-                <a:lnTo>
-                  <a:pt x="5747166" y="521259"/>
-                </a:lnTo>
-                <a:lnTo>
-                  <a:pt x="5995876" y="525463"/>
-                </a:lnTo>
-                <a:lnTo>
-                  <a:pt x="6247025" y="525463"/>
-                </a:lnTo>
-                <a:lnTo>
-                  <a:pt x="6500612" y="527565"/>
-                </a:lnTo>
-                <a:lnTo>
-                  <a:pt x="6756638" y="525463"/>
-                </a:lnTo>
-                <a:lnTo>
-                  <a:pt x="7016321" y="521259"/>
-                </a:lnTo>
-                <a:lnTo>
-                  <a:pt x="7276004" y="517406"/>
-                </a:lnTo>
-                <a:lnTo>
-                  <a:pt x="7539344" y="508998"/>
-                </a:lnTo>
-                <a:lnTo>
-                  <a:pt x="7805123" y="500241"/>
-                </a:lnTo>
-                <a:lnTo>
-                  <a:pt x="8070902" y="490082"/>
-                </a:lnTo>
-                <a:lnTo>
-                  <a:pt x="8339120" y="475719"/>
-                </a:lnTo>
-                <a:lnTo>
-                  <a:pt x="8609775" y="458554"/>
-                </a:lnTo>
-                <a:lnTo>
-                  <a:pt x="8881650" y="442089"/>
-                </a:lnTo>
-                <a:lnTo>
-                  <a:pt x="9153525" y="421071"/>
-                </a:lnTo>
-                <a:lnTo>
-                  <a:pt x="9429057" y="395849"/>
-                </a:lnTo>
-                <a:lnTo>
-                  <a:pt x="9700932" y="370626"/>
-                </a:lnTo>
-                <a:lnTo>
-                  <a:pt x="9977683" y="341551"/>
-                </a:lnTo>
-                <a:lnTo>
-                  <a:pt x="10255654" y="309673"/>
-                </a:lnTo>
-                <a:lnTo>
-                  <a:pt x="10529967" y="276043"/>
-                </a:lnTo>
-                <a:lnTo>
-                  <a:pt x="10807938" y="236809"/>
-                </a:lnTo>
-                <a:lnTo>
-                  <a:pt x="11084689" y="194772"/>
-                </a:lnTo>
-                <a:lnTo>
-                  <a:pt x="11362660" y="153085"/>
-                </a:lnTo>
-                <a:lnTo>
-                  <a:pt x="11639411" y="104392"/>
-                </a:lnTo>
-                <a:lnTo>
-                  <a:pt x="11914944" y="54648"/>
-                </a:lnTo>
-                <a:lnTo>
-                  <a:pt x="12191695" y="2452"/>
-                </a:lnTo>
-                <a:lnTo>
-                  <a:pt x="12191695" y="2162231"/>
-                </a:lnTo>
-                <a:lnTo>
-                  <a:pt x="12192417" y="2162231"/>
-                </a:lnTo>
-                <a:lnTo>
-                  <a:pt x="12192417" y="5095933"/>
-                </a:lnTo>
-                <a:lnTo>
-                  <a:pt x="0" y="5095933"/>
-                </a:lnTo>
-                <a:lnTo>
-                  <a:pt x="0" y="2791958"/>
-                </a:lnTo>
-                <a:lnTo>
-                  <a:pt x="0" y="2162231"/>
-                </a:lnTo>
-                <a:close/>
-              </a:path>
-            </a:pathLst>
-          </a:custGeom>
-          <a:ln>
-            <a:noFill/>
-          </a:ln>
-        </p:spPr>
-      </p:sp>
-      <p:sp>
-        <p:nvSpPr>
-          <p:cNvPr id="2" name="Title 1">
-            <a:extLst>
-              <a:ext uri="{FF2B5EF4-FFF2-40B4-BE49-F238E27FC236}">
-                <a16:creationId xmlns:a16="http://schemas.microsoft.com/office/drawing/2014/main" id="{70CD8B78-5DC2-7841-B6B4-46AEBD4589EA}"/>
-              </a:ext>
-            </a:extLst>
-          </p:cNvPr>
-          <p:cNvSpPr>
-            <a:spLocks noGrp="1"/>
-          </p:cNvSpPr>
-          <p:nvPr>
-            <p:ph type="title"/>
-          </p:nvPr>
-        </p:nvSpPr>
-        <p:spPr>
-          <a:xfrm>
-            <a:off x="1103312" y="452718"/>
-            <a:ext cx="8947522" cy="1400530"/>
-          </a:xfrm>
-        </p:spPr>
-        <p:txBody>
-          <a:bodyPr anchor="ctr">
-            <a:normAutofit/>
-          </a:bodyPr>
-          <a:lstStyle/>
-          <a:p>
-            <a:r>
-              <a:rPr lang="en-US" dirty="0">
-                <a:solidFill>
-                  <a:srgbClr val="FFFFFF"/>
-                </a:solidFill>
-              </a:rPr>
-              <a:t>Findings</a:t>
-            </a:r>
-          </a:p>
-        </p:txBody>
-      </p:sp>
-      <p:sp>
-        <p:nvSpPr>
-          <p:cNvPr id="3" name="Content Placeholder 2">
-            <a:extLst>
-              <a:ext uri="{FF2B5EF4-FFF2-40B4-BE49-F238E27FC236}">
-                <a16:creationId xmlns:a16="http://schemas.microsoft.com/office/drawing/2014/main" id="{0ECE8FB7-DA5C-CB43-B50F-0C8F8F56A63C}"/>
-              </a:ext>
-            </a:extLst>
-          </p:cNvPr>
-          <p:cNvSpPr>
-            <a:spLocks noGrp="1"/>
-          </p:cNvSpPr>
-          <p:nvPr>
-            <p:ph idx="1"/>
-          </p:nvPr>
-        </p:nvSpPr>
-        <p:spPr>
-          <a:xfrm>
-            <a:off x="1103312" y="2603392"/>
-            <a:ext cx="8946541" cy="3484879"/>
-          </a:xfrm>
-        </p:spPr>
-        <p:txBody>
-          <a:bodyPr>
-            <a:normAutofit/>
-          </a:bodyPr>
-          <a:lstStyle/>
-          <a:p>
-            <a:pPr>
-              <a:lnSpc>
-                <a:spcPct val="90000"/>
-              </a:lnSpc>
-            </a:pPr>
-            <a:r>
-              <a:rPr lang="en-US" sz="1400" dirty="0"/>
-              <a:t>	</a:t>
-            </a:r>
-          </a:p>
-          <a:p>
-            <a:pPr>
-              <a:lnSpc>
-                <a:spcPct val="90000"/>
-              </a:lnSpc>
-            </a:pPr>
-            <a:r>
-              <a:rPr lang="en-US" sz="1800" dirty="0"/>
-              <a:t>As shown in the visualizations below, it can be inferred that Males tend to drive more recklessly than Females.</a:t>
-            </a:r>
-          </a:p>
-          <a:p>
-            <a:pPr>
-              <a:lnSpc>
-                <a:spcPct val="90000"/>
-              </a:lnSpc>
-            </a:pPr>
-            <a:r>
-              <a:rPr lang="en-US" sz="1800" dirty="0"/>
-              <a:t>Fatal Injuries tend to occur in Male Senior Drivers than any other Age Group.</a:t>
-            </a:r>
-          </a:p>
-          <a:p>
-            <a:pPr>
-              <a:lnSpc>
-                <a:spcPct val="90000"/>
-              </a:lnSpc>
-            </a:pPr>
-            <a:r>
-              <a:rPr lang="en-US" sz="1800" dirty="0"/>
-              <a:t>Male adults aged 50 and up tend to have much more total accidents than both the &lt;18 and 19-29 age groups combined.</a:t>
-            </a:r>
-          </a:p>
-          <a:p>
-            <a:pPr>
-              <a:lnSpc>
-                <a:spcPct val="90000"/>
-              </a:lnSpc>
-            </a:pPr>
-            <a:r>
-              <a:rPr lang="en-US" sz="1800" dirty="0"/>
-              <a:t>Surprisingly, the &lt;18 age group has significantly less accidents than every other age group, which could be caused by teens delaying getting a driver license or a stricter rules imposed by local authorities.</a:t>
-            </a:r>
-          </a:p>
-          <a:p>
-            <a:pPr>
-              <a:lnSpc>
-                <a:spcPct val="90000"/>
-              </a:lnSpc>
-            </a:pPr>
-            <a:r>
-              <a:rPr lang="en-US" sz="1800" dirty="0"/>
-              <a:t>Although many accidents occur each year, over half of them, regardless of gender or age, result in No Injury.</a:t>
-            </a:r>
-          </a:p>
-        </p:txBody>
-      </p:sp>
-    </p:spTree>
-    <p:extLst>
-      <p:ext uri="{BB962C8B-B14F-4D97-AF65-F5344CB8AC3E}">
-        <p14:creationId xmlns:p14="http://schemas.microsoft.com/office/powerpoint/2010/main" val="1112845196"/>
-      </p:ext>
-    </p:extLst>
-  </p:cSld>
-  <p:clrMapOvr>
-    <a:overrideClrMapping bg1="lt1" tx1="dk1" bg2="lt2" tx2="dk2" accent1="accent1" accent2="accent2" accent3="accent3" accent4="accent4" accent5="accent5" accent6="accent6" hlink="hlink" folHlink="folHlink"/>
-  </p:clrMapOvr>
-</p:sld>
-</file>
-
-<file path=ppt/slides/slide5.xml><?xml version="1.0" encoding="utf-8"?>
-<p:sld xmlns:a="http://schemas.openxmlformats.org/drawingml/2006/main" xmlns:r="http://schemas.openxmlformats.org/officeDocument/2006/relationships" xmlns:p="http://schemas.openxmlformats.org/presentationml/2006/main">
-  <p:cSld>
-    <p:bg>
-      <p:bgPr>
         <a:blipFill rotWithShape="1">
-          <a:blip r:embed="rId2">
+          <a:blip r:embed="rId3">
             <a:duotone>
               <a:schemeClr val="bg2">
                 <a:shade val="69000"/>
@@ -10210,7 +9783,7 @@
       </p:grpSpPr>
       <p:pic>
         <p:nvPicPr>
-          <p:cNvPr id="30" name="Picture 29">
+          <p:cNvPr id="49" name="Picture 48">
             <a:extLst>
               <a:ext uri="{FF2B5EF4-FFF2-40B4-BE49-F238E27FC236}">
                 <a16:creationId xmlns:a16="http://schemas.microsoft.com/office/drawing/2014/main" id="{C9ECDD5C-152A-4CC7-8333-0F367B3A62EA}"/>
@@ -10232,7 +9805,7 @@
           </p:nvPr>
         </p:nvPicPr>
         <p:blipFill rotWithShape="1">
-          <a:blip r:embed="rId3">
+          <a:blip r:embed="rId4">
             <a:extLst>
               <a:ext uri="{28A0092B-C50C-407E-A947-70E740481C1C}">
                 <a14:useLocalDpi xmlns:a14="http://schemas.microsoft.com/office/drawing/2010/main" val="0"/>
@@ -10254,7 +9827,7 @@
       </p:pic>
       <p:pic>
         <p:nvPicPr>
-          <p:cNvPr id="32" name="Picture 31">
+          <p:cNvPr id="51" name="Picture 50">
             <a:extLst>
               <a:ext uri="{FF2B5EF4-FFF2-40B4-BE49-F238E27FC236}">
                 <a16:creationId xmlns:a16="http://schemas.microsoft.com/office/drawing/2014/main" id="{7F5C92A3-369B-43F3-BDCE-E560B1B0EC89}"/>
@@ -10276,7 +9849,7 @@
           </p:nvPr>
         </p:nvPicPr>
         <p:blipFill rotWithShape="1">
-          <a:blip r:embed="rId4">
+          <a:blip r:embed="rId5">
             <a:extLst>
               <a:ext uri="{28A0092B-C50C-407E-A947-70E740481C1C}">
                 <a14:useLocalDpi xmlns:a14="http://schemas.microsoft.com/office/drawing/2010/main" val="0"/>
@@ -10298,7 +9871,7 @@
       </p:pic>
       <p:sp>
         <p:nvSpPr>
-          <p:cNvPr id="34" name="Oval 33">
+          <p:cNvPr id="53" name="Oval 52">
             <a:extLst>
               <a:ext uri="{FF2B5EF4-FFF2-40B4-BE49-F238E27FC236}">
                 <a16:creationId xmlns:a16="http://schemas.microsoft.com/office/drawing/2014/main" id="{AEBE9F1A-B38D-446E-83AE-14B17CE77FF2}"/>
@@ -10378,7 +9951,7 @@
       </p:sp>
       <p:pic>
         <p:nvPicPr>
-          <p:cNvPr id="36" name="Picture 35">
+          <p:cNvPr id="55" name="Picture 54">
             <a:extLst>
               <a:ext uri="{FF2B5EF4-FFF2-40B4-BE49-F238E27FC236}">
                 <a16:creationId xmlns:a16="http://schemas.microsoft.com/office/drawing/2014/main" id="{915B5014-A7EC-4BA6-9C83-8840CF81DB28}"/>
@@ -10400,7 +9973,7 @@
           </p:nvPr>
         </p:nvPicPr>
         <p:blipFill rotWithShape="1">
-          <a:blip r:embed="rId5">
+          <a:blip r:embed="rId6">
             <a:extLst>
               <a:ext uri="{28A0092B-C50C-407E-A947-70E740481C1C}">
                 <a14:useLocalDpi xmlns:a14="http://schemas.microsoft.com/office/drawing/2010/main" val="0"/>
@@ -10422,7 +9995,7 @@
       </p:pic>
       <p:pic>
         <p:nvPicPr>
-          <p:cNvPr id="38" name="Picture 37">
+          <p:cNvPr id="57" name="Picture 56">
             <a:extLst>
               <a:ext uri="{FF2B5EF4-FFF2-40B4-BE49-F238E27FC236}">
                 <a16:creationId xmlns:a16="http://schemas.microsoft.com/office/drawing/2014/main" id="{022C43AB-86D7-420D-8AD7-DC0A15FDD0AF}"/>
@@ -10444,7 +10017,7 @@
           </p:nvPr>
         </p:nvPicPr>
         <p:blipFill rotWithShape="1">
-          <a:blip r:embed="rId6">
+          <a:blip r:embed="rId7">
             <a:extLst>
               <a:ext uri="{28A0092B-C50C-407E-A947-70E740481C1C}">
                 <a14:useLocalDpi xmlns:a14="http://schemas.microsoft.com/office/drawing/2010/main" val="0"/>
@@ -10466,7 +10039,7 @@
       </p:pic>
       <p:sp>
         <p:nvSpPr>
-          <p:cNvPr id="40" name="Rectangle 39">
+          <p:cNvPr id="59" name="Rectangle 58">
             <a:extLst>
               <a:ext uri="{FF2B5EF4-FFF2-40B4-BE49-F238E27FC236}">
                 <a16:creationId xmlns:a16="http://schemas.microsoft.com/office/drawing/2014/main" id="{5E3EB826-A471-488F-9E8A-D65528A3C0CA}"/>
@@ -10519,7 +10092,7 @@
       </p:sp>
       <p:sp>
         <p:nvSpPr>
-          <p:cNvPr id="42" name="Rectangle 41">
+          <p:cNvPr id="61" name="Rectangle 60">
             <a:extLst>
               <a:ext uri="{FF2B5EF4-FFF2-40B4-BE49-F238E27FC236}">
                 <a16:creationId xmlns:a16="http://schemas.microsoft.com/office/drawing/2014/main" id="{DFB3CEA1-88D9-42FB-88ED-1E9807FE6596}"/>
@@ -10582,10 +10155,10 @@
       </p:sp>
       <p:pic>
         <p:nvPicPr>
-          <p:cNvPr id="10" name="Content Placeholder 9">
+          <p:cNvPr id="4" name="Content Placeholder 3">
             <a:extLst>
               <a:ext uri="{FF2B5EF4-FFF2-40B4-BE49-F238E27FC236}">
-                <a16:creationId xmlns:a16="http://schemas.microsoft.com/office/drawing/2014/main" id="{721FE8F4-84C1-F34B-97DE-1BD637B3DC53}"/>
+                <a16:creationId xmlns:a16="http://schemas.microsoft.com/office/drawing/2014/main" id="{32292EF8-78FD-154A-8B41-5173744A9FF2}"/>
               </a:ext>
             </a:extLst>
           </p:cNvPr>
@@ -10597,7 +10170,7 @@
           </p:nvPr>
         </p:nvPicPr>
         <p:blipFill>
-          <a:blip r:embed="rId7"/>
+          <a:blip r:embed="rId8"/>
           <a:stretch>
             <a:fillRect/>
           </a:stretch>
@@ -10614,7 +10187,7 @@
       </p:pic>
       <p:sp>
         <p:nvSpPr>
-          <p:cNvPr id="44" name="Rectangle 43">
+          <p:cNvPr id="63" name="Rectangle 62">
             <a:extLst>
               <a:ext uri="{FF2B5EF4-FFF2-40B4-BE49-F238E27FC236}">
                 <a16:creationId xmlns:a16="http://schemas.microsoft.com/office/drawing/2014/main" id="{9A6C928E-4252-4F33-8C34-E50A12A3170B}"/>
@@ -10942,4 +10515,299 @@
     </a:ext>
   </a:extLst>
 </a:theme>
+</file>
+
+<file path=ppt/theme/theme2.xml><?xml version="1.0" encoding="utf-8"?>
+<a:theme xmlns:a="http://schemas.openxmlformats.org/drawingml/2006/main" name="Office Theme">
+  <a:themeElements>
+    <a:clrScheme name="Office">
+      <a:dk1>
+        <a:sysClr val="windowText" lastClr="000000"/>
+      </a:dk1>
+      <a:lt1>
+        <a:sysClr val="window" lastClr="FFFFFF"/>
+      </a:lt1>
+      <a:dk2>
+        <a:srgbClr val="44546A"/>
+      </a:dk2>
+      <a:lt2>
+        <a:srgbClr val="E7E6E6"/>
+      </a:lt2>
+      <a:accent1>
+        <a:srgbClr val="4472C4"/>
+      </a:accent1>
+      <a:accent2>
+        <a:srgbClr val="ED7D31"/>
+      </a:accent2>
+      <a:accent3>
+        <a:srgbClr val="A5A5A5"/>
+      </a:accent3>
+      <a:accent4>
+        <a:srgbClr val="FFC000"/>
+      </a:accent4>
+      <a:accent5>
+        <a:srgbClr val="5B9BD5"/>
+      </a:accent5>
+      <a:accent6>
+        <a:srgbClr val="70AD47"/>
+      </a:accent6>
+      <a:hlink>
+        <a:srgbClr val="0563C1"/>
+      </a:hlink>
+      <a:folHlink>
+        <a:srgbClr val="954F72"/>
+      </a:folHlink>
+    </a:clrScheme>
+    <a:fontScheme name="Office">
+      <a:majorFont>
+        <a:latin typeface="Calibri Light" panose="020F0302020204030204"/>
+        <a:ea typeface=""/>
+        <a:cs typeface=""/>
+        <a:font script="Jpan" typeface="游ゴシック Light"/>
+        <a:font script="Hang" typeface="맑은 고딕"/>
+        <a:font script="Hans" typeface="等线 Light"/>
+        <a:font script="Hant" typeface="新細明體"/>
+        <a:font script="Arab" typeface="Times New Roman"/>
+        <a:font script="Hebr" typeface="Times New Roman"/>
+        <a:font script="Thai" typeface="Angsana New"/>
+        <a:font script="Ethi" typeface="Nyala"/>
+        <a:font script="Beng" typeface="Vrinda"/>
+        <a:font script="Gujr" typeface="Shruti"/>
+        <a:font script="Khmr" typeface="MoolBoran"/>
+        <a:font script="Knda" typeface="Tunga"/>
+        <a:font script="Guru" typeface="Raavi"/>
+        <a:font script="Cans" typeface="Euphemia"/>
+        <a:font script="Cher" typeface="Plantagenet Cherokee"/>
+        <a:font script="Yiii" typeface="Microsoft Yi Baiti"/>
+        <a:font script="Tibt" typeface="Microsoft Himalaya"/>
+        <a:font script="Thaa" typeface="MV Boli"/>
+        <a:font script="Deva" typeface="Mangal"/>
+        <a:font script="Telu" typeface="Gautami"/>
+        <a:font script="Taml" typeface="Latha"/>
+        <a:font script="Syrc" typeface="Estrangelo Edessa"/>
+        <a:font script="Orya" typeface="Kalinga"/>
+        <a:font script="Mlym" typeface="Kartika"/>
+        <a:font script="Laoo" typeface="DokChampa"/>
+        <a:font script="Sinh" typeface="Iskoola Pota"/>
+        <a:font script="Mong" typeface="Mongolian Baiti"/>
+        <a:font script="Viet" typeface="Times New Roman"/>
+        <a:font script="Uigh" typeface="Microsoft Uighur"/>
+        <a:font script="Geor" typeface="Sylfaen"/>
+        <a:font script="Armn" typeface="Arial"/>
+        <a:font script="Bugi" typeface="Leelawadee UI"/>
+        <a:font script="Bopo" typeface="Microsoft JhengHei"/>
+        <a:font script="Java" typeface="Javanese Text"/>
+        <a:font script="Lisu" typeface="Segoe UI"/>
+        <a:font script="Mymr" typeface="Myanmar Text"/>
+        <a:font script="Nkoo" typeface="Ebrima"/>
+        <a:font script="Olck" typeface="Nirmala UI"/>
+        <a:font script="Osma" typeface="Ebrima"/>
+        <a:font script="Phag" typeface="Phagspa"/>
+        <a:font script="Syrn" typeface="Estrangelo Edessa"/>
+        <a:font script="Syrj" typeface="Estrangelo Edessa"/>
+        <a:font script="Syre" typeface="Estrangelo Edessa"/>
+        <a:font script="Sora" typeface="Nirmala UI"/>
+        <a:font script="Tale" typeface="Microsoft Tai Le"/>
+        <a:font script="Talu" typeface="Microsoft New Tai Lue"/>
+        <a:font script="Tfng" typeface="Ebrima"/>
+      </a:majorFont>
+      <a:minorFont>
+        <a:latin typeface="Calibri" panose="020F0502020204030204"/>
+        <a:ea typeface=""/>
+        <a:cs typeface=""/>
+        <a:font script="Jpan" typeface="游ゴシック"/>
+        <a:font script="Hang" typeface="맑은 고딕"/>
+        <a:font script="Hans" typeface="等线"/>
+        <a:font script="Hant" typeface="新細明體"/>
+        <a:font script="Arab" typeface="Arial"/>
+        <a:font script="Hebr" typeface="Arial"/>
+        <a:font script="Thai" typeface="Cordia New"/>
+        <a:font script="Ethi" typeface="Nyala"/>
+        <a:font script="Beng" typeface="Vrinda"/>
+        <a:font script="Gujr" typeface="Shruti"/>
+        <a:font script="Khmr" typeface="DaunPenh"/>
+        <a:font script="Knda" typeface="Tunga"/>
+        <a:font script="Guru" typeface="Raavi"/>
+        <a:font script="Cans" typeface="Euphemia"/>
+        <a:font script="Cher" typeface="Plantagenet Cherokee"/>
+        <a:font script="Yiii" typeface="Microsoft Yi Baiti"/>
+        <a:font script="Tibt" typeface="Microsoft Himalaya"/>
+        <a:font script="Thaa" typeface="MV Boli"/>
+        <a:font script="Deva" typeface="Mangal"/>
+        <a:font script="Telu" typeface="Gautami"/>
+        <a:font script="Taml" typeface="Latha"/>
+        <a:font script="Syrc" typeface="Estrangelo Edessa"/>
+        <a:font script="Orya" typeface="Kalinga"/>
+        <a:font script="Mlym" typeface="Kartika"/>
+        <a:font script="Laoo" typeface="DokChampa"/>
+        <a:font script="Sinh" typeface="Iskoola Pota"/>
+        <a:font script="Mong" typeface="Mongolian Baiti"/>
+        <a:font script="Viet" typeface="Arial"/>
+        <a:font script="Uigh" typeface="Microsoft Uighur"/>
+        <a:font script="Geor" typeface="Sylfaen"/>
+        <a:font script="Armn" typeface="Arial"/>
+        <a:font script="Bugi" typeface="Leelawadee UI"/>
+        <a:font script="Bopo" typeface="Microsoft JhengHei"/>
+        <a:font script="Java" typeface="Javanese Text"/>
+        <a:font script="Lisu" typeface="Segoe UI"/>
+        <a:font script="Mymr" typeface="Myanmar Text"/>
+        <a:font script="Nkoo" typeface="Ebrima"/>
+        <a:font script="Olck" typeface="Nirmala UI"/>
+        <a:font script="Osma" typeface="Ebrima"/>
+        <a:font script="Phag" typeface="Phagspa"/>
+        <a:font script="Syrn" typeface="Estrangelo Edessa"/>
+        <a:font script="Syrj" typeface="Estrangelo Edessa"/>
+        <a:font script="Syre" typeface="Estrangelo Edessa"/>
+        <a:font script="Sora" typeface="Nirmala UI"/>
+        <a:font script="Tale" typeface="Microsoft Tai Le"/>
+        <a:font script="Talu" typeface="Microsoft New Tai Lue"/>
+        <a:font script="Tfng" typeface="Ebrima"/>
+      </a:minorFont>
+    </a:fontScheme>
+    <a:fmtScheme name="Office">
+      <a:fillStyleLst>
+        <a:solidFill>
+          <a:schemeClr val="phClr"/>
+        </a:solidFill>
+        <a:gradFill rotWithShape="1">
+          <a:gsLst>
+            <a:gs pos="0">
+              <a:schemeClr val="phClr">
+                <a:lumMod val="110000"/>
+                <a:satMod val="105000"/>
+                <a:tint val="67000"/>
+              </a:schemeClr>
+            </a:gs>
+            <a:gs pos="50000">
+              <a:schemeClr val="phClr">
+                <a:lumMod val="105000"/>
+                <a:satMod val="103000"/>
+                <a:tint val="73000"/>
+              </a:schemeClr>
+            </a:gs>
+            <a:gs pos="100000">
+              <a:schemeClr val="phClr">
+                <a:lumMod val="105000"/>
+                <a:satMod val="109000"/>
+                <a:tint val="81000"/>
+              </a:schemeClr>
+            </a:gs>
+          </a:gsLst>
+          <a:lin ang="5400000" scaled="0"/>
+        </a:gradFill>
+        <a:gradFill rotWithShape="1">
+          <a:gsLst>
+            <a:gs pos="0">
+              <a:schemeClr val="phClr">
+                <a:satMod val="103000"/>
+                <a:lumMod val="102000"/>
+                <a:tint val="94000"/>
+              </a:schemeClr>
+            </a:gs>
+            <a:gs pos="50000">
+              <a:schemeClr val="phClr">
+                <a:satMod val="110000"/>
+                <a:lumMod val="100000"/>
+                <a:shade val="100000"/>
+              </a:schemeClr>
+            </a:gs>
+            <a:gs pos="100000">
+              <a:schemeClr val="phClr">
+                <a:lumMod val="99000"/>
+                <a:satMod val="120000"/>
+                <a:shade val="78000"/>
+              </a:schemeClr>
+            </a:gs>
+          </a:gsLst>
+          <a:lin ang="5400000" scaled="0"/>
+        </a:gradFill>
+      </a:fillStyleLst>
+      <a:lnStyleLst>
+        <a:ln w="6350" cap="flat" cmpd="sng" algn="ctr">
+          <a:solidFill>
+            <a:schemeClr val="phClr"/>
+          </a:solidFill>
+          <a:prstDash val="solid"/>
+          <a:miter lim="800000"/>
+        </a:ln>
+        <a:ln w="12700" cap="flat" cmpd="sng" algn="ctr">
+          <a:solidFill>
+            <a:schemeClr val="phClr"/>
+          </a:solidFill>
+          <a:prstDash val="solid"/>
+          <a:miter lim="800000"/>
+        </a:ln>
+        <a:ln w="19050" cap="flat" cmpd="sng" algn="ctr">
+          <a:solidFill>
+            <a:schemeClr val="phClr"/>
+          </a:solidFill>
+          <a:prstDash val="solid"/>
+          <a:miter lim="800000"/>
+        </a:ln>
+      </a:lnStyleLst>
+      <a:effectStyleLst>
+        <a:effectStyle>
+          <a:effectLst/>
+        </a:effectStyle>
+        <a:effectStyle>
+          <a:effectLst/>
+        </a:effectStyle>
+        <a:effectStyle>
+          <a:effectLst>
+            <a:outerShdw blurRad="57150" dist="19050" dir="5400000" algn="ctr" rotWithShape="0">
+              <a:srgbClr val="000000">
+                <a:alpha val="63000"/>
+              </a:srgbClr>
+            </a:outerShdw>
+          </a:effectLst>
+        </a:effectStyle>
+      </a:effectStyleLst>
+      <a:bgFillStyleLst>
+        <a:solidFill>
+          <a:schemeClr val="phClr"/>
+        </a:solidFill>
+        <a:solidFill>
+          <a:schemeClr val="phClr">
+            <a:tint val="95000"/>
+            <a:satMod val="170000"/>
+          </a:schemeClr>
+        </a:solidFill>
+        <a:gradFill rotWithShape="1">
+          <a:gsLst>
+            <a:gs pos="0">
+              <a:schemeClr val="phClr">
+                <a:tint val="93000"/>
+                <a:satMod val="150000"/>
+                <a:shade val="98000"/>
+                <a:lumMod val="102000"/>
+              </a:schemeClr>
+            </a:gs>
+            <a:gs pos="50000">
+              <a:schemeClr val="phClr">
+                <a:tint val="98000"/>
+                <a:satMod val="130000"/>
+                <a:shade val="90000"/>
+                <a:lumMod val="103000"/>
+              </a:schemeClr>
+            </a:gs>
+            <a:gs pos="100000">
+              <a:schemeClr val="phClr">
+                <a:shade val="63000"/>
+                <a:satMod val="120000"/>
+              </a:schemeClr>
+            </a:gs>
+          </a:gsLst>
+          <a:lin ang="5400000" scaled="0"/>
+        </a:gradFill>
+      </a:bgFillStyleLst>
+    </a:fmtScheme>
+  </a:themeElements>
+  <a:objectDefaults/>
+  <a:extraClrSchemeLst/>
+  <a:extLst>
+    <a:ext uri="{05A4C25C-085E-4340-85A3-A5531E510DB2}">
+      <thm15:themeFamily xmlns:thm15="http://schemas.microsoft.com/office/thememl/2012/main" name="Office Theme" id="{62F939B6-93AF-4DB8-9C6B-D6C7DFDC589F}" vid="{4A3C46E8-61CC-4603-A589-7422A47A8E4A}"/>
+    </a:ext>
+  </a:extLst>
+</a:theme>
 </file>
</xml_diff>